<commit_message>
Titles in ppt fixed
</commit_message>
<xml_diff>
--- a/Documentation/Design Reviews/Design Review 1.pptx
+++ b/Documentation/Design Reviews/Design Review 1.pptx
@@ -129,6 +129,264 @@
     </a:lvl9pPr>
   </p:defaultTextStyle>
 </p:presentation>
+</file>
+
+<file path=ppt/charts/chart1.xml><?xml version="1.0" encoding="utf-8"?>
+<c:chartSpace xmlns:c="http://schemas.openxmlformats.org/drawingml/2006/chart" xmlns:a="http://schemas.openxmlformats.org/drawingml/2006/main" xmlns:r="http://schemas.openxmlformats.org/officeDocument/2006/relationships">
+  <c:date1904 val="0"/>
+  <c:lang val="en-US"/>
+  <c:roundedCorners val="0"/>
+  <mc:AlternateContent xmlns:mc="http://schemas.openxmlformats.org/markup-compatibility/2006">
+    <mc:Choice xmlns:c14="http://schemas.microsoft.com/office/drawing/2007/8/2/chart" Requires="c14">
+      <c14:style val="102"/>
+    </mc:Choice>
+    <mc:Fallback>
+      <c:style val="2"/>
+    </mc:Fallback>
+  </mc:AlternateContent>
+  <c:chart>
+    <c:autoTitleDeleted val="0"/>
+    <c:plotArea>
+      <c:layout/>
+      <c:pieChart>
+        <c:varyColors val="1"/>
+        <c:ser>
+          <c:idx val="0"/>
+          <c:order val="0"/>
+          <c:dLbls>
+            <c:showLegendKey val="0"/>
+            <c:showVal val="1"/>
+            <c:showCatName val="0"/>
+            <c:showSerName val="0"/>
+            <c:showPercent val="0"/>
+            <c:showBubbleSize val="0"/>
+            <c:showLeaderLines val="1"/>
+          </c:dLbls>
+          <c:cat>
+            <c:strRef>
+              <c:f>Sheet1!$A$40:$A$48</c:f>
+              <c:strCache>
+                <c:ptCount val="9"/>
+                <c:pt idx="0">
+                  <c:v>LabVIEW Robotics </c:v>
+                </c:pt>
+                <c:pt idx="1">
+                  <c:v>Real Time Controller</c:v>
+                </c:pt>
+                <c:pt idx="2">
+                  <c:v>Controller Interface Module</c:v>
+                </c:pt>
+                <c:pt idx="3">
+                  <c:v>Wheel and Gyro Motors</c:v>
+                </c:pt>
+                <c:pt idx="4">
+                  <c:v>Motor Controller</c:v>
+                </c:pt>
+                <c:pt idx="5">
+                  <c:v>Wrist Motor</c:v>
+                </c:pt>
+                <c:pt idx="6">
+                  <c:v>Wrist Motor Controller</c:v>
+                </c:pt>
+                <c:pt idx="7">
+                  <c:v>Battery </c:v>
+                </c:pt>
+                <c:pt idx="8">
+                  <c:v>Inertial Measurement Unit </c:v>
+                </c:pt>
+              </c:strCache>
+            </c:strRef>
+          </c:cat>
+          <c:val>
+            <c:numRef>
+              <c:f>Sheet1!$B$40:$B$48</c:f>
+              <c:numCache>
+                <c:formatCode>"$"#,##0_);[Red]\("$"#,##0\)</c:formatCode>
+                <c:ptCount val="9"/>
+                <c:pt idx="0">
+                  <c:v>15000</c:v>
+                </c:pt>
+                <c:pt idx="1">
+                  <c:v>8000</c:v>
+                </c:pt>
+                <c:pt idx="2">
+                  <c:v>600</c:v>
+                </c:pt>
+                <c:pt idx="3">
+                  <c:v>150</c:v>
+                </c:pt>
+                <c:pt idx="4">
+                  <c:v>350</c:v>
+                </c:pt>
+                <c:pt idx="5">
+                  <c:v>150</c:v>
+                </c:pt>
+                <c:pt idx="6">
+                  <c:v>400</c:v>
+                </c:pt>
+                <c:pt idx="7">
+                  <c:v>90</c:v>
+                </c:pt>
+                <c:pt idx="8">
+                  <c:v>3000</c:v>
+                </c:pt>
+              </c:numCache>
+            </c:numRef>
+          </c:val>
+        </c:ser>
+        <c:dLbls>
+          <c:showLegendKey val="0"/>
+          <c:showVal val="0"/>
+          <c:showCatName val="0"/>
+          <c:showSerName val="0"/>
+          <c:showPercent val="0"/>
+          <c:showBubbleSize val="0"/>
+          <c:showLeaderLines val="1"/>
+        </c:dLbls>
+        <c:firstSliceAng val="0"/>
+      </c:pieChart>
+    </c:plotArea>
+    <c:legend>
+      <c:legendPos val="r"/>
+      <c:layout>
+        <c:manualLayout>
+          <c:xMode val="edge"/>
+          <c:yMode val="edge"/>
+          <c:x val="0.71166639853608915"/>
+          <c:y val="0.28125497417661505"/>
+          <c:w val="0.19458359047895463"/>
+          <c:h val="0.43748983997967994"/>
+        </c:manualLayout>
+      </c:layout>
+      <c:overlay val="0"/>
+    </c:legend>
+    <c:plotVisOnly val="1"/>
+    <c:dispBlanksAs val="gap"/>
+    <c:showDLblsOverMax val="0"/>
+  </c:chart>
+  <c:externalData r:id="rId1">
+    <c:autoUpdate val="0"/>
+  </c:externalData>
+</c:chartSpace>
+</file>
+
+<file path=ppt/charts/chart2.xml><?xml version="1.0" encoding="utf-8"?>
+<c:chartSpace xmlns:c="http://schemas.openxmlformats.org/drawingml/2006/chart" xmlns:a="http://schemas.openxmlformats.org/drawingml/2006/main" xmlns:r="http://schemas.openxmlformats.org/officeDocument/2006/relationships">
+  <c:date1904 val="0"/>
+  <c:lang val="en-US"/>
+  <c:roundedCorners val="0"/>
+  <mc:AlternateContent xmlns:mc="http://schemas.openxmlformats.org/markup-compatibility/2006">
+    <mc:Choice xmlns:c14="http://schemas.microsoft.com/office/drawing/2007/8/2/chart" Requires="c14">
+      <c14:style val="102"/>
+    </mc:Choice>
+    <mc:Fallback>
+      <c:style val="2"/>
+    </mc:Fallback>
+  </mc:AlternateContent>
+  <c:chart>
+    <c:autoTitleDeleted val="0"/>
+    <c:plotArea>
+      <c:layout/>
+      <c:pieChart>
+        <c:varyColors val="1"/>
+        <c:ser>
+          <c:idx val="0"/>
+          <c:order val="0"/>
+          <c:dLbls>
+            <c:dLblPos val="bestFit"/>
+            <c:showLegendKey val="0"/>
+            <c:showVal val="1"/>
+            <c:showCatName val="0"/>
+            <c:showSerName val="0"/>
+            <c:showPercent val="0"/>
+            <c:showBubbleSize val="0"/>
+            <c:showLeaderLines val="1"/>
+          </c:dLbls>
+          <c:cat>
+            <c:strRef>
+              <c:f>'[Chart in Microsoft PowerPoint]Sheet1'!$A$42:$A$48</c:f>
+              <c:strCache>
+                <c:ptCount val="7"/>
+                <c:pt idx="0">
+                  <c:v>Controller Interface Module</c:v>
+                </c:pt>
+                <c:pt idx="1">
+                  <c:v>Wheel and Gyro Motors</c:v>
+                </c:pt>
+                <c:pt idx="2">
+                  <c:v>Motor Controller</c:v>
+                </c:pt>
+                <c:pt idx="3">
+                  <c:v>Wrist Motor</c:v>
+                </c:pt>
+                <c:pt idx="4">
+                  <c:v>Wrist Motor Controller</c:v>
+                </c:pt>
+                <c:pt idx="5">
+                  <c:v>Battery </c:v>
+                </c:pt>
+                <c:pt idx="6">
+                  <c:v>Inertial Measurement Unit </c:v>
+                </c:pt>
+              </c:strCache>
+            </c:strRef>
+          </c:cat>
+          <c:val>
+            <c:numRef>
+              <c:f>'[Chart in Microsoft PowerPoint]Sheet1'!$B$42:$B$48</c:f>
+              <c:numCache>
+                <c:formatCode>"$"#,##0_);[Red]\("$"#,##0\)</c:formatCode>
+                <c:ptCount val="7"/>
+                <c:pt idx="0">
+                  <c:v>600</c:v>
+                </c:pt>
+                <c:pt idx="1">
+                  <c:v>150</c:v>
+                </c:pt>
+                <c:pt idx="2">
+                  <c:v>350</c:v>
+                </c:pt>
+                <c:pt idx="3">
+                  <c:v>150</c:v>
+                </c:pt>
+                <c:pt idx="4">
+                  <c:v>400</c:v>
+                </c:pt>
+                <c:pt idx="5">
+                  <c:v>90</c:v>
+                </c:pt>
+                <c:pt idx="6">
+                  <c:v>3000</c:v>
+                </c:pt>
+              </c:numCache>
+            </c:numRef>
+          </c:val>
+        </c:ser>
+        <c:dLbls>
+          <c:showLegendKey val="0"/>
+          <c:showVal val="0"/>
+          <c:showCatName val="0"/>
+          <c:showSerName val="0"/>
+          <c:showPercent val="0"/>
+          <c:showBubbleSize val="0"/>
+          <c:showLeaderLines val="1"/>
+        </c:dLbls>
+        <c:firstSliceAng val="0"/>
+      </c:pieChart>
+    </c:plotArea>
+    <c:legend>
+      <c:legendPos val="r"/>
+      <c:layout/>
+      <c:overlay val="0"/>
+    </c:legend>
+    <c:plotVisOnly val="1"/>
+    <c:dispBlanksAs val="gap"/>
+    <c:showDLblsOverMax val="0"/>
+  </c:chart>
+  <c:externalData r:id="rId1">
+    <c:autoUpdate val="0"/>
+  </c:externalData>
+</c:chartSpace>
 </file>
 
 <file path=ppt/diagrams/colors1.xml><?xml version="1.0" encoding="utf-8"?>
@@ -1411,30 +1669,30 @@
     </dgm:pt>
   </dgm:ptLst>
   <dgm:cxnLst>
+    <dgm:cxn modelId="{3315D23B-2CFF-4564-8C5B-949FBD8DF287}" type="presOf" srcId="{4C1B39BF-F010-4321-A742-3FBC32925276}" destId="{47177BF1-5F2D-48EF-8497-21FE3FD9FE79}" srcOrd="0" destOrd="0" presId="urn:microsoft.com/office/officeart/2008/layout/RadialCluster"/>
+    <dgm:cxn modelId="{93F051FE-4DAD-4282-B99F-B0F7FF420B95}" srcId="{20BE8E71-F497-468A-8BCF-867CD172525E}" destId="{73692DD7-5A4E-48BB-B470-C5A4DA4EC749}" srcOrd="4" destOrd="0" parTransId="{8E16C110-46DD-418E-B68B-41176C7363CB}" sibTransId="{F993AD63-E991-4E38-8297-04B334507A7E}"/>
+    <dgm:cxn modelId="{9801DC9E-87CA-482B-BEFD-C61AA9E8153B}" type="presOf" srcId="{8F9A3036-4F59-4DA9-BC69-9C65CC5FF756}" destId="{4F1D4343-F068-4E09-A4D6-84538D008E3A}" srcOrd="0" destOrd="0" presId="urn:microsoft.com/office/officeart/2008/layout/RadialCluster"/>
+    <dgm:cxn modelId="{C2859883-5757-46E9-8E4F-5E8DE07FE54E}" srcId="{20BE8E71-F497-468A-8BCF-867CD172525E}" destId="{4C1B39BF-F010-4321-A742-3FBC32925276}" srcOrd="6" destOrd="0" parTransId="{4231E3A6-8236-41B8-8CD9-63D77671A4C8}" sibTransId="{5200D3A7-3CAD-44FB-B8C1-9407EA7D36E6}"/>
+    <dgm:cxn modelId="{37D790B7-A6B2-486C-AC56-3F127FDFC93D}" type="presOf" srcId="{2CAD2807-D227-4017-ADAE-4A618EC18CA1}" destId="{3C9F8E07-2750-4F18-8439-C39435BC2A48}" srcOrd="0" destOrd="0" presId="urn:microsoft.com/office/officeart/2008/layout/RadialCluster"/>
+    <dgm:cxn modelId="{CBD0D219-0D1F-4AD5-9833-EB8FF4BB68DE}" type="presOf" srcId="{A582B7BA-4838-4A95-B337-9DB7268116E5}" destId="{6A9A5629-B80C-4D13-8A9A-8E0030CA29C6}" srcOrd="0" destOrd="0" presId="urn:microsoft.com/office/officeart/2008/layout/RadialCluster"/>
+    <dgm:cxn modelId="{84A1FB9D-2A24-4CE0-84DB-F1DA371028CC}" srcId="{2F4CBA2C-CAAA-42CF-B78F-87DEEF1B277A}" destId="{20BE8E71-F497-468A-8BCF-867CD172525E}" srcOrd="0" destOrd="0" parTransId="{10E7CD52-C70D-4B0D-BA73-39E7D6E0C441}" sibTransId="{C709E9FE-A76B-44F6-BBD4-8043D15198BD}"/>
+    <dgm:cxn modelId="{A3229B7A-98F5-4A02-B1BC-20C1B2FD93E3}" srcId="{20BE8E71-F497-468A-8BCF-867CD172525E}" destId="{CDB2F97C-D222-4B7B-AD17-9B1FCACAE65F}" srcOrd="5" destOrd="0" parTransId="{6D930E7D-F4CB-4AC6-8B6C-E671E00D2CDA}" sibTransId="{3DB89215-6E3B-42AE-A1CB-3027719161AB}"/>
+    <dgm:cxn modelId="{687A8EDA-2547-4B66-A2DF-5F77F1D17C87}" type="presOf" srcId="{20BE8E71-F497-468A-8BCF-867CD172525E}" destId="{EA7B28CB-2911-4779-869A-AEC78C5F1671}" srcOrd="0" destOrd="0" presId="urn:microsoft.com/office/officeart/2008/layout/RadialCluster"/>
+    <dgm:cxn modelId="{0BB6BE93-6D07-4673-BD6D-65D3ADF9CEC3}" type="presOf" srcId="{2F4CBA2C-CAAA-42CF-B78F-87DEEF1B277A}" destId="{F3FFE5E4-1BC0-4B54-81AE-AA579CAF2653}" srcOrd="0" destOrd="0" presId="urn:microsoft.com/office/officeart/2008/layout/RadialCluster"/>
+    <dgm:cxn modelId="{8C68F102-B0A2-4886-87E1-F9FB7D1B138B}" srcId="{20BE8E71-F497-468A-8BCF-867CD172525E}" destId="{BD98ED33-66DC-415F-9A6F-2546BAAF3B3D}" srcOrd="1" destOrd="0" parTransId="{14D5249F-26A5-4564-AB2D-600D54F71173}" sibTransId="{33D01D21-955E-4F24-A18E-4041C0D6DE2B}"/>
     <dgm:cxn modelId="{86581E74-C593-4A2D-BD5E-CE1BC5CC7E25}" srcId="{20BE8E71-F497-468A-8BCF-867CD172525E}" destId="{8F9A3036-4F59-4DA9-BC69-9C65CC5FF756}" srcOrd="2" destOrd="0" parTransId="{2CAD2807-D227-4017-ADAE-4A618EC18CA1}" sibTransId="{37768D46-5764-48A9-B061-92B3238D2032}"/>
+    <dgm:cxn modelId="{592CB8F0-757C-454F-820C-9ECAD0BA8C6C}" type="presOf" srcId="{23159B30-BD23-4DDD-8C73-F4E0AA557D76}" destId="{52F0F047-BCCC-42EF-9CAE-76E3CB0C88BA}" srcOrd="0" destOrd="0" presId="urn:microsoft.com/office/officeart/2008/layout/RadialCluster"/>
+    <dgm:cxn modelId="{985F22C7-0E7D-42A9-953C-A246EBC99718}" srcId="{20BE8E71-F497-468A-8BCF-867CD172525E}" destId="{23159B30-BD23-4DDD-8C73-F4E0AA557D76}" srcOrd="0" destOrd="0" parTransId="{7EA5189C-8A82-4E31-B8DE-1A2F0B8D4C54}" sibTransId="{F4542481-DB3E-488C-ACCA-3E4EB5875099}"/>
+    <dgm:cxn modelId="{0E26857C-86C4-4BCD-9F66-26E63A1CA80C}" type="presOf" srcId="{BD98ED33-66DC-415F-9A6F-2546BAAF3B3D}" destId="{323636B3-28E9-4D84-9B24-4CA99FA81ACE}" srcOrd="0" destOrd="0" presId="urn:microsoft.com/office/officeart/2008/layout/RadialCluster"/>
+    <dgm:cxn modelId="{9AA18266-4943-45ED-A460-D5F91AC5B52E}" type="presOf" srcId="{36786B02-748A-4748-B2D4-5874F7413149}" destId="{F3A44B51-B4D8-4EB5-89F7-4849638C9113}" srcOrd="0" destOrd="0" presId="urn:microsoft.com/office/officeart/2008/layout/RadialCluster"/>
+    <dgm:cxn modelId="{C5384FD1-877F-4593-8247-FA395F924F75}" type="presOf" srcId="{14D5249F-26A5-4564-AB2D-600D54F71173}" destId="{B84AF4A8-3947-45EA-8993-17FEB967E4E7}" srcOrd="0" destOrd="0" presId="urn:microsoft.com/office/officeart/2008/layout/RadialCluster"/>
+    <dgm:cxn modelId="{6A2E968B-2B00-4302-9A51-BA269571DA50}" type="presOf" srcId="{8E16C110-46DD-418E-B68B-41176C7363CB}" destId="{0B933785-8F10-4908-A031-95865622E3A9}" srcOrd="0" destOrd="0" presId="urn:microsoft.com/office/officeart/2008/layout/RadialCluster"/>
+    <dgm:cxn modelId="{122508DC-A576-4A03-83E4-985FEF1A8B82}" srcId="{20BE8E71-F497-468A-8BCF-867CD172525E}" destId="{A582B7BA-4838-4A95-B337-9DB7268116E5}" srcOrd="3" destOrd="0" parTransId="{36786B02-748A-4748-B2D4-5874F7413149}" sibTransId="{4C297DF1-AEBE-4A83-A484-A60056753F8A}"/>
+    <dgm:cxn modelId="{F93764F6-6CF4-486A-B088-61AFCBE74DDC}" type="presOf" srcId="{4231E3A6-8236-41B8-8CD9-63D77671A4C8}" destId="{FB5C7847-0F50-42C0-A98F-6F92FFC53D0B}" srcOrd="0" destOrd="0" presId="urn:microsoft.com/office/officeart/2008/layout/RadialCluster"/>
     <dgm:cxn modelId="{26F7855D-5015-4F58-ADC8-48ABC6F68CC6}" type="presOf" srcId="{CDB2F97C-D222-4B7B-AD17-9B1FCACAE65F}" destId="{946220FF-E030-4205-92BF-46A67B7F2879}" srcOrd="0" destOrd="0" presId="urn:microsoft.com/office/officeart/2008/layout/RadialCluster"/>
-    <dgm:cxn modelId="{3315D23B-2CFF-4564-8C5B-949FBD8DF287}" type="presOf" srcId="{4C1B39BF-F010-4321-A742-3FBC32925276}" destId="{47177BF1-5F2D-48EF-8497-21FE3FD9FE79}" srcOrd="0" destOrd="0" presId="urn:microsoft.com/office/officeart/2008/layout/RadialCluster"/>
-    <dgm:cxn modelId="{6A2E968B-2B00-4302-9A51-BA269571DA50}" type="presOf" srcId="{8E16C110-46DD-418E-B68B-41176C7363CB}" destId="{0B933785-8F10-4908-A031-95865622E3A9}" srcOrd="0" destOrd="0" presId="urn:microsoft.com/office/officeart/2008/layout/RadialCluster"/>
-    <dgm:cxn modelId="{0BB6BE93-6D07-4673-BD6D-65D3ADF9CEC3}" type="presOf" srcId="{2F4CBA2C-CAAA-42CF-B78F-87DEEF1B277A}" destId="{F3FFE5E4-1BC0-4B54-81AE-AA579CAF2653}" srcOrd="0" destOrd="0" presId="urn:microsoft.com/office/officeart/2008/layout/RadialCluster"/>
-    <dgm:cxn modelId="{A3229B7A-98F5-4A02-B1BC-20C1B2FD93E3}" srcId="{20BE8E71-F497-468A-8BCF-867CD172525E}" destId="{CDB2F97C-D222-4B7B-AD17-9B1FCACAE65F}" srcOrd="5" destOrd="0" parTransId="{6D930E7D-F4CB-4AC6-8B6C-E671E00D2CDA}" sibTransId="{3DB89215-6E3B-42AE-A1CB-3027719161AB}"/>
-    <dgm:cxn modelId="{CBD0D219-0D1F-4AD5-9833-EB8FF4BB68DE}" type="presOf" srcId="{A582B7BA-4838-4A95-B337-9DB7268116E5}" destId="{6A9A5629-B80C-4D13-8A9A-8E0030CA29C6}" srcOrd="0" destOrd="0" presId="urn:microsoft.com/office/officeart/2008/layout/RadialCluster"/>
-    <dgm:cxn modelId="{93F051FE-4DAD-4282-B99F-B0F7FF420B95}" srcId="{20BE8E71-F497-468A-8BCF-867CD172525E}" destId="{73692DD7-5A4E-48BB-B470-C5A4DA4EC749}" srcOrd="4" destOrd="0" parTransId="{8E16C110-46DD-418E-B68B-41176C7363CB}" sibTransId="{F993AD63-E991-4E38-8297-04B334507A7E}"/>
-    <dgm:cxn modelId="{F93764F6-6CF4-486A-B088-61AFCBE74DDC}" type="presOf" srcId="{4231E3A6-8236-41B8-8CD9-63D77671A4C8}" destId="{FB5C7847-0F50-42C0-A98F-6F92FFC53D0B}" srcOrd="0" destOrd="0" presId="urn:microsoft.com/office/officeart/2008/layout/RadialCluster"/>
-    <dgm:cxn modelId="{8C68F102-B0A2-4886-87E1-F9FB7D1B138B}" srcId="{20BE8E71-F497-468A-8BCF-867CD172525E}" destId="{BD98ED33-66DC-415F-9A6F-2546BAAF3B3D}" srcOrd="1" destOrd="0" parTransId="{14D5249F-26A5-4564-AB2D-600D54F71173}" sibTransId="{33D01D21-955E-4F24-A18E-4041C0D6DE2B}"/>
-    <dgm:cxn modelId="{9801DC9E-87CA-482B-BEFD-C61AA9E8153B}" type="presOf" srcId="{8F9A3036-4F59-4DA9-BC69-9C65CC5FF756}" destId="{4F1D4343-F068-4E09-A4D6-84538D008E3A}" srcOrd="0" destOrd="0" presId="urn:microsoft.com/office/officeart/2008/layout/RadialCluster"/>
-    <dgm:cxn modelId="{592CB8F0-757C-454F-820C-9ECAD0BA8C6C}" type="presOf" srcId="{23159B30-BD23-4DDD-8C73-F4E0AA557D76}" destId="{52F0F047-BCCC-42EF-9CAE-76E3CB0C88BA}" srcOrd="0" destOrd="0" presId="urn:microsoft.com/office/officeart/2008/layout/RadialCluster"/>
-    <dgm:cxn modelId="{C2859883-5757-46E9-8E4F-5E8DE07FE54E}" srcId="{20BE8E71-F497-468A-8BCF-867CD172525E}" destId="{4C1B39BF-F010-4321-A742-3FBC32925276}" srcOrd="6" destOrd="0" parTransId="{4231E3A6-8236-41B8-8CD9-63D77671A4C8}" sibTransId="{5200D3A7-3CAD-44FB-B8C1-9407EA7D36E6}"/>
-    <dgm:cxn modelId="{122508DC-A576-4A03-83E4-985FEF1A8B82}" srcId="{20BE8E71-F497-468A-8BCF-867CD172525E}" destId="{A582B7BA-4838-4A95-B337-9DB7268116E5}" srcOrd="3" destOrd="0" parTransId="{36786B02-748A-4748-B2D4-5874F7413149}" sibTransId="{4C297DF1-AEBE-4A83-A484-A60056753F8A}"/>
-    <dgm:cxn modelId="{C5384FD1-877F-4593-8247-FA395F924F75}" type="presOf" srcId="{14D5249F-26A5-4564-AB2D-600D54F71173}" destId="{B84AF4A8-3947-45EA-8993-17FEB967E4E7}" srcOrd="0" destOrd="0" presId="urn:microsoft.com/office/officeart/2008/layout/RadialCluster"/>
-    <dgm:cxn modelId="{37D790B7-A6B2-486C-AC56-3F127FDFC93D}" type="presOf" srcId="{2CAD2807-D227-4017-ADAE-4A618EC18CA1}" destId="{3C9F8E07-2750-4F18-8439-C39435BC2A48}" srcOrd="0" destOrd="0" presId="urn:microsoft.com/office/officeart/2008/layout/RadialCluster"/>
-    <dgm:cxn modelId="{84A1FB9D-2A24-4CE0-84DB-F1DA371028CC}" srcId="{2F4CBA2C-CAAA-42CF-B78F-87DEEF1B277A}" destId="{20BE8E71-F497-468A-8BCF-867CD172525E}" srcOrd="0" destOrd="0" parTransId="{10E7CD52-C70D-4B0D-BA73-39E7D6E0C441}" sibTransId="{C709E9FE-A76B-44F6-BBD4-8043D15198BD}"/>
     <dgm:cxn modelId="{CB4208AA-8711-4B6B-B368-C5B8083D375F}" type="presOf" srcId="{6D930E7D-F4CB-4AC6-8B6C-E671E00D2CDA}" destId="{B5E74FB8-825C-4828-9A1C-A241752DC65C}" srcOrd="0" destOrd="0" presId="urn:microsoft.com/office/officeart/2008/layout/RadialCluster"/>
-    <dgm:cxn modelId="{0E26857C-86C4-4BCD-9F66-26E63A1CA80C}" type="presOf" srcId="{BD98ED33-66DC-415F-9A6F-2546BAAF3B3D}" destId="{323636B3-28E9-4D84-9B24-4CA99FA81ACE}" srcOrd="0" destOrd="0" presId="urn:microsoft.com/office/officeart/2008/layout/RadialCluster"/>
     <dgm:cxn modelId="{61CD37EC-E091-4684-BA08-16DEF43099BB}" type="presOf" srcId="{7EA5189C-8A82-4E31-B8DE-1A2F0B8D4C54}" destId="{C2CB6F57-0576-413F-A293-A0E78B21B9F8}" srcOrd="0" destOrd="0" presId="urn:microsoft.com/office/officeart/2008/layout/RadialCluster"/>
-    <dgm:cxn modelId="{985F22C7-0E7D-42A9-953C-A246EBC99718}" srcId="{20BE8E71-F497-468A-8BCF-867CD172525E}" destId="{23159B30-BD23-4DDD-8C73-F4E0AA557D76}" srcOrd="0" destOrd="0" parTransId="{7EA5189C-8A82-4E31-B8DE-1A2F0B8D4C54}" sibTransId="{F4542481-DB3E-488C-ACCA-3E4EB5875099}"/>
     <dgm:cxn modelId="{137A4AF1-06F5-4D8A-8F96-21F19B99C142}" type="presOf" srcId="{73692DD7-5A4E-48BB-B470-C5A4DA4EC749}" destId="{42C18C40-B4AA-446C-B562-40C2969136A5}" srcOrd="0" destOrd="0" presId="urn:microsoft.com/office/officeart/2008/layout/RadialCluster"/>
-    <dgm:cxn modelId="{687A8EDA-2547-4B66-A2DF-5F77F1D17C87}" type="presOf" srcId="{20BE8E71-F497-468A-8BCF-867CD172525E}" destId="{EA7B28CB-2911-4779-869A-AEC78C5F1671}" srcOrd="0" destOrd="0" presId="urn:microsoft.com/office/officeart/2008/layout/RadialCluster"/>
-    <dgm:cxn modelId="{9AA18266-4943-45ED-A460-D5F91AC5B52E}" type="presOf" srcId="{36786B02-748A-4748-B2D4-5874F7413149}" destId="{F3A44B51-B4D8-4EB5-89F7-4849638C9113}" srcOrd="0" destOrd="0" presId="urn:microsoft.com/office/officeart/2008/layout/RadialCluster"/>
     <dgm:cxn modelId="{BFFCAA7A-7A50-4032-9C89-D6620E9AD265}" type="presParOf" srcId="{F3FFE5E4-1BC0-4B54-81AE-AA579CAF2653}" destId="{B22068D3-DDED-4F7A-869F-113F94CC087D}" srcOrd="0" destOrd="0" presId="urn:microsoft.com/office/officeart/2008/layout/RadialCluster"/>
     <dgm:cxn modelId="{22E76D57-FA4B-4090-8D7B-637F59289991}" type="presParOf" srcId="{B22068D3-DDED-4F7A-869F-113F94CC087D}" destId="{EA7B28CB-2911-4779-869A-AEC78C5F1671}" srcOrd="0" destOrd="0" presId="urn:microsoft.com/office/officeart/2008/layout/RadialCluster"/>
     <dgm:cxn modelId="{C4FCDBE5-0DDD-44F7-B65C-D908399031A9}" type="presParOf" srcId="{B22068D3-DDED-4F7A-869F-113F94CC087D}" destId="{C2CB6F57-0576-413F-A293-A0E78B21B9F8}" srcOrd="1" destOrd="0" presId="urn:microsoft.com/office/officeart/2008/layout/RadialCluster"/>
@@ -8075,13 +8333,8 @@
             </a:r>
             <a:r>
               <a:rPr lang="en-US" baseline="0" dirty="0" smtClean="0"/>
-              <a:t> </a:t>
-            </a:r>
-            <a:r>
-              <a:rPr lang="en-US" baseline="0" dirty="0" smtClean="0"/>
-              <a:t>have been asked by national instruments to design and build a self balancing unicycle robot to showcase NI’s newest robotics toolkit.  </a:t>
-            </a:r>
-            <a:endParaRPr lang="en-US" baseline="0" dirty="0" smtClean="0"/>
+              <a:t> have been asked by national instruments to design and build a self balancing unicycle robot to showcase NI’s newest robotics toolkit.  </a:t>
+            </a:r>
           </a:p>
           <a:p>
             <a:pPr marL="0" marR="0" indent="0" algn="l" defTabSz="914400" rtl="0" eaLnBrk="1" fontAlgn="auto" latinLnBrk="0" hangingPunct="1">
@@ -8123,21 +8376,12 @@
             </a:pPr>
             <a:r>
               <a:rPr lang="en-US" baseline="0" dirty="0" smtClean="0"/>
-              <a:t>National </a:t>
+              <a:t>National Instruments has developed a full </a:t>
             </a:r>
             <a:r>
               <a:rPr lang="en-US" baseline="0" dirty="0" smtClean="0"/>
-              <a:t>Instruments has developed a full real time controlling suite to be all encompassing with the LabVIEW Robotics toolkit and their Real-Time controllers, specifically to us the compact Rio, or </a:t>
-            </a:r>
-            <a:r>
-              <a:rPr lang="en-US" baseline="0" dirty="0" err="1" smtClean="0"/>
-              <a:t>cRIO</a:t>
-            </a:r>
-            <a:r>
-              <a:rPr lang="en-US" baseline="0" dirty="0" smtClean="0"/>
-              <a:t>.  </a:t>
-            </a:r>
-            <a:endParaRPr lang="en-US" baseline="0" dirty="0" smtClean="0"/>
+              <a:t>solution to solving challenging controls problems with real time components, and this project is meant to show how a challenging controls problem can be solved using their components.  </a:t>
+            </a:r>
           </a:p>
           <a:p>
             <a:pPr marL="0" marR="0" indent="0" algn="l" defTabSz="914400" rtl="0" eaLnBrk="1" fontAlgn="auto" latinLnBrk="0" hangingPunct="1">
@@ -8157,6 +8401,38 @@
               <a:tabLst/>
               <a:defRPr/>
             </a:pPr>
+            <a:endParaRPr lang="en-US" baseline="0" dirty="0" smtClean="0"/>
+          </a:p>
+          <a:p>
+            <a:pPr marL="0" marR="0" indent="0" algn="l" defTabSz="914400" rtl="0" eaLnBrk="1" fontAlgn="auto" latinLnBrk="0" hangingPunct="1">
+              <a:lnSpc>
+                <a:spcPct val="100000"/>
+              </a:lnSpc>
+              <a:spcBef>
+                <a:spcPts val="0"/>
+              </a:spcBef>
+              <a:spcAft>
+                <a:spcPts val="0"/>
+              </a:spcAft>
+              <a:buClrTx/>
+              <a:buSzTx/>
+              <a:buFontTx/>
+              <a:buNone/>
+              <a:tabLst/>
+              <a:defRPr/>
+            </a:pPr>
+            <a:r>
+              <a:rPr lang="en-US" baseline="0" dirty="0" smtClean="0"/>
+              <a:t>Our task is to develop a self balancing, autonomous unicycle style robot that can withstand disturbances such as light pushing.  It does not have to navigate to a specific point or move at all, it only needs to balance </a:t>
+            </a:r>
+            <a:r>
+              <a:rPr lang="en-US" baseline="0" dirty="0" err="1" smtClean="0"/>
+              <a:t>independantly</a:t>
+            </a:r>
+            <a:r>
+              <a:rPr lang="en-US" baseline="0" dirty="0" smtClean="0"/>
+              <a:t>.</a:t>
+            </a:r>
             <a:endParaRPr lang="en-US" baseline="0" dirty="0" smtClean="0"/>
           </a:p>
           <a:p>
@@ -8580,7 +8856,10 @@
               <a:tabLst/>
               <a:defRPr/>
             </a:pPr>
-            <a:endParaRPr lang="en-US" baseline="0" dirty="0" smtClean="0"/>
+            <a:r>
+              <a:rPr lang="en-US" baseline="0" dirty="0" smtClean="0"/>
+              <a:t>Our basic approach to the project is broken up into 4 stages</a:t>
+            </a:r>
           </a:p>
           <a:p>
             <a:pPr marL="0" marR="0" indent="0" algn="l" defTabSz="914400" rtl="0" eaLnBrk="1" fontAlgn="auto" latinLnBrk="0" hangingPunct="1">
@@ -8600,13 +8879,29 @@
               <a:tabLst/>
               <a:defRPr/>
             </a:pPr>
+            <a:endParaRPr lang="en-US" baseline="0" dirty="0" smtClean="0"/>
+          </a:p>
+          <a:p>
+            <a:pPr marL="0" marR="0" indent="0" algn="l" defTabSz="914400" rtl="0" eaLnBrk="1" fontAlgn="auto" latinLnBrk="0" hangingPunct="1">
+              <a:lnSpc>
+                <a:spcPct val="100000"/>
+              </a:lnSpc>
+              <a:spcBef>
+                <a:spcPts val="0"/>
+              </a:spcBef>
+              <a:spcAft>
+                <a:spcPts val="0"/>
+              </a:spcAft>
+              <a:buClrTx/>
+              <a:buSzTx/>
+              <a:buFontTx/>
+              <a:buNone/>
+              <a:tabLst/>
+              <a:defRPr/>
+            </a:pPr>
             <a:r>
               <a:rPr lang="en-US" baseline="0" dirty="0" smtClean="0"/>
-              <a:t>We </a:t>
-            </a:r>
-            <a:r>
-              <a:rPr lang="en-US" baseline="0" dirty="0" smtClean="0"/>
-              <a:t>will start by modeling the system in the </a:t>
+              <a:t>We will start by modeling the system in the </a:t>
             </a:r>
             <a:r>
               <a:rPr lang="en-US" baseline="0" dirty="0" err="1" smtClean="0"/>
@@ -8614,7 +8909,123 @@
             </a:r>
             <a:r>
               <a:rPr lang="en-US" baseline="0" dirty="0" smtClean="0"/>
-              <a:t> robotics environment simulator, and develop our control algorithms using the simulator.  Then, once we are confident in our control algorithms, we will use the </a:t>
+              <a:t> robotics environment simulator, and </a:t>
+            </a:r>
+            <a:endParaRPr lang="en-US" baseline="0" dirty="0" smtClean="0"/>
+          </a:p>
+          <a:p>
+            <a:pPr marL="0" marR="0" indent="0" algn="l" defTabSz="914400" rtl="0" eaLnBrk="1" fontAlgn="auto" latinLnBrk="0" hangingPunct="1">
+              <a:lnSpc>
+                <a:spcPct val="100000"/>
+              </a:lnSpc>
+              <a:spcBef>
+                <a:spcPts val="0"/>
+              </a:spcBef>
+              <a:spcAft>
+                <a:spcPts val="0"/>
+              </a:spcAft>
+              <a:buClrTx/>
+              <a:buSzTx/>
+              <a:buFontTx/>
+              <a:buNone/>
+              <a:tabLst/>
+              <a:defRPr/>
+            </a:pPr>
+            <a:endParaRPr lang="en-US" baseline="0" dirty="0" smtClean="0"/>
+          </a:p>
+          <a:p>
+            <a:pPr marL="0" marR="0" indent="0" algn="l" defTabSz="914400" rtl="0" eaLnBrk="1" fontAlgn="auto" latinLnBrk="0" hangingPunct="1">
+              <a:lnSpc>
+                <a:spcPct val="100000"/>
+              </a:lnSpc>
+              <a:spcBef>
+                <a:spcPts val="0"/>
+              </a:spcBef>
+              <a:spcAft>
+                <a:spcPts val="0"/>
+              </a:spcAft>
+              <a:buClrTx/>
+              <a:buSzTx/>
+              <a:buFontTx/>
+              <a:buNone/>
+              <a:tabLst/>
+              <a:defRPr/>
+            </a:pPr>
+            <a:r>
+              <a:rPr lang="en-US" baseline="0" dirty="0" smtClean="0"/>
+              <a:t>After we have an accurate model, we will develop </a:t>
+            </a:r>
+            <a:r>
+              <a:rPr lang="en-US" baseline="0" dirty="0" smtClean="0"/>
+              <a:t>our control algorithms </a:t>
+            </a:r>
+            <a:r>
+              <a:rPr lang="en-US" baseline="0" dirty="0" smtClean="0"/>
+              <a:t>within </a:t>
+            </a:r>
+            <a:r>
+              <a:rPr lang="en-US" baseline="0" dirty="0" err="1" smtClean="0"/>
+              <a:t>labview</a:t>
+            </a:r>
+            <a:r>
+              <a:rPr lang="en-US" baseline="0" dirty="0" smtClean="0"/>
+              <a:t> using </a:t>
+            </a:r>
+            <a:r>
+              <a:rPr lang="en-US" baseline="0" dirty="0" smtClean="0"/>
+              <a:t>the simulator.  </a:t>
+            </a:r>
+            <a:endParaRPr lang="en-US" baseline="0" dirty="0" smtClean="0"/>
+          </a:p>
+          <a:p>
+            <a:pPr marL="0" marR="0" indent="0" algn="l" defTabSz="914400" rtl="0" eaLnBrk="1" fontAlgn="auto" latinLnBrk="0" hangingPunct="1">
+              <a:lnSpc>
+                <a:spcPct val="100000"/>
+              </a:lnSpc>
+              <a:spcBef>
+                <a:spcPts val="0"/>
+              </a:spcBef>
+              <a:spcAft>
+                <a:spcPts val="0"/>
+              </a:spcAft>
+              <a:buClrTx/>
+              <a:buSzTx/>
+              <a:buFontTx/>
+              <a:buNone/>
+              <a:tabLst/>
+              <a:defRPr/>
+            </a:pPr>
+            <a:endParaRPr lang="en-US" baseline="0" dirty="0" smtClean="0"/>
+          </a:p>
+          <a:p>
+            <a:pPr marL="0" marR="0" indent="0" algn="l" defTabSz="914400" rtl="0" eaLnBrk="1" fontAlgn="auto" latinLnBrk="0" hangingPunct="1">
+              <a:lnSpc>
+                <a:spcPct val="100000"/>
+              </a:lnSpc>
+              <a:spcBef>
+                <a:spcPts val="0"/>
+              </a:spcBef>
+              <a:spcAft>
+                <a:spcPts val="0"/>
+              </a:spcAft>
+              <a:buClrTx/>
+              <a:buSzTx/>
+              <a:buFontTx/>
+              <a:buNone/>
+              <a:tabLst/>
+              <a:defRPr/>
+            </a:pPr>
+            <a:r>
+              <a:rPr lang="en-US" baseline="0" dirty="0" smtClean="0"/>
+              <a:t>Once </a:t>
+            </a:r>
+            <a:r>
+              <a:rPr lang="en-US" baseline="0" dirty="0" smtClean="0"/>
+              <a:t>we are confident in our control algorithms, we will </a:t>
+            </a:r>
+            <a:r>
+              <a:rPr lang="en-US" baseline="0" dirty="0" smtClean="0"/>
+              <a:t>build a physical robot using a </a:t>
             </a:r>
             <a:r>
               <a:rPr lang="en-US" baseline="0" dirty="0" err="1" smtClean="0"/>
@@ -8622,7 +9033,50 @@
             </a:r>
             <a:r>
               <a:rPr lang="en-US" baseline="0" dirty="0" smtClean="0"/>
-              <a:t> to control our physical robot.</a:t>
+              <a:t> real time controller to control it.</a:t>
+            </a:r>
+          </a:p>
+          <a:p>
+            <a:pPr marL="0" marR="0" indent="0" algn="l" defTabSz="914400" rtl="0" eaLnBrk="1" fontAlgn="auto" latinLnBrk="0" hangingPunct="1">
+              <a:lnSpc>
+                <a:spcPct val="100000"/>
+              </a:lnSpc>
+              <a:spcBef>
+                <a:spcPts val="0"/>
+              </a:spcBef>
+              <a:spcAft>
+                <a:spcPts val="0"/>
+              </a:spcAft>
+              <a:buClrTx/>
+              <a:buSzTx/>
+              <a:buFontTx/>
+              <a:buNone/>
+              <a:tabLst/>
+              <a:defRPr/>
+            </a:pPr>
+            <a:endParaRPr lang="en-US" baseline="0" dirty="0" smtClean="0"/>
+          </a:p>
+          <a:p>
+            <a:pPr marL="0" marR="0" indent="0" algn="l" defTabSz="914400" rtl="0" eaLnBrk="1" fontAlgn="auto" latinLnBrk="0" hangingPunct="1">
+              <a:lnSpc>
+                <a:spcPct val="100000"/>
+              </a:lnSpc>
+              <a:spcBef>
+                <a:spcPts val="0"/>
+              </a:spcBef>
+              <a:spcAft>
+                <a:spcPts val="0"/>
+              </a:spcAft>
+              <a:buClrTx/>
+              <a:buSzTx/>
+              <a:buFontTx/>
+              <a:buNone/>
+              <a:tabLst/>
+              <a:defRPr/>
+            </a:pPr>
+            <a:r>
+              <a:rPr lang="en-US" baseline="0" dirty="0" smtClean="0"/>
+              <a:t>After we have a physical prototype, there will need to be a lot of debugging.  As we can already tell, the simulation environment is great, but may not produce the most accurate models, so there will need to be a lot of time at the end for fine tuning our control algorithms.</a:t>
             </a:r>
             <a:endParaRPr lang="en-US" dirty="0" smtClean="0"/>
           </a:p>
@@ -8773,37 +9227,16 @@
             </a:pPr>
             <a:r>
               <a:rPr lang="en-US" dirty="0" smtClean="0"/>
-              <a:t>Here </a:t>
+              <a:t>Here you can see our project plan.  </a:t>
             </a:r>
             <a:r>
               <a:rPr lang="en-US" dirty="0" smtClean="0"/>
-              <a:t>you can see our project plan.  An</a:t>
+              <a:t>The green line represents</a:t>
             </a:r>
             <a:r>
               <a:rPr lang="en-US" baseline="0" dirty="0" smtClean="0"/>
-              <a:t> important thing to note is how long we are leaving purely for debugging.  We have a good understanding of the problem, and are confident that our solution will work, but one thing that we determined very early was that we would like to have a working version of it before the end of winter quarter to leave plenty of time to tune our control algorithm.  </a:t>
-            </a:r>
-            <a:endParaRPr lang="en-US" dirty="0" smtClean="0"/>
-          </a:p>
-          <a:p>
-            <a:pPr marL="0" marR="0" indent="0" algn="l" defTabSz="914400" rtl="0" eaLnBrk="1" fontAlgn="auto" latinLnBrk="0" hangingPunct="1">
-              <a:lnSpc>
-                <a:spcPct val="100000"/>
-              </a:lnSpc>
-              <a:spcBef>
-                <a:spcPts val="0"/>
-              </a:spcBef>
-              <a:spcAft>
-                <a:spcPts val="0"/>
-              </a:spcAft>
-              <a:buClrTx/>
-              <a:buSzTx/>
-              <a:buFontTx/>
-              <a:buNone/>
-              <a:tabLst/>
-              <a:defRPr/>
-            </a:pPr>
-            <a:endParaRPr lang="en-US" dirty="0"/>
+              <a:t> our current position in the plan, the checkboxes representing what has been accomplished.  The fall has been and will continue to be primarily laying the groundwork for our project.  We would like to have all of our components and make sure that we understand how they work and how to use them effectively.  Then next quarter, we will be able to quickly and efficiently develop a control algorithm and build a physical model that will hopefully result in a working prototype by the end of the quarter.  Then spring quarter is left entirely for debugging and final documentation.</a:t>
+            </a:r>
           </a:p>
         </p:txBody>
       </p:sp>
@@ -12838,11 +13271,7 @@
           <a:p>
             <a:r>
               <a:rPr lang="en-US" sz="2800" dirty="0" smtClean="0"/>
-              <a:t>Project Plan – </a:t>
-            </a:r>
-            <a:r>
-              <a:rPr lang="en-US" sz="2800" dirty="0" smtClean="0"/>
-              <a:t>Structural Components</a:t>
+              <a:t>Project Plan – Structural Components</a:t>
             </a:r>
             <a:endParaRPr lang="en-US" sz="2800" dirty="0"/>
           </a:p>
@@ -13815,11 +14244,6 @@
               </a:rPr>
               <a:t>Modeling</a:t>
             </a:r>
-            <a:endParaRPr lang="en-US" sz="1400" dirty="0" smtClean="0">
-              <a:solidFill>
-                <a:schemeClr val="bg1"/>
-              </a:solidFill>
-            </a:endParaRPr>
           </a:p>
           <a:p>
             <a:r>
@@ -14736,11 +15160,7 @@
           <a:p>
             <a:r>
               <a:rPr lang="en-US" sz="2800" dirty="0" smtClean="0"/>
-              <a:t>Control </a:t>
-            </a:r>
-            <a:r>
-              <a:rPr lang="en-US" sz="2800" dirty="0" smtClean="0"/>
-              <a:t>Strategy</a:t>
+              <a:t>Control Strategy</a:t>
             </a:r>
           </a:p>
         </p:txBody>
@@ -16472,11 +16892,7 @@
           <a:p>
             <a:r>
               <a:rPr lang="en-US" sz="2800" dirty="0" smtClean="0"/>
-              <a:t>Control Strategies </a:t>
-            </a:r>
-            <a:r>
-              <a:rPr lang="en-US" sz="2800" dirty="0" smtClean="0"/>
-              <a:t>– LabVIEW Front Panel Example</a:t>
+              <a:t>Control Strategies – LabVIEW Front Panel Example</a:t>
             </a:r>
             <a:endParaRPr lang="en-US" sz="2800" dirty="0"/>
           </a:p>
@@ -17327,11 +17743,7 @@
           <a:p>
             <a:r>
               <a:rPr lang="en-US" sz="2800" dirty="0" smtClean="0"/>
-              <a:t>Modeling - Proposed </a:t>
-            </a:r>
-            <a:r>
-              <a:rPr lang="en-US" sz="2800" dirty="0" smtClean="0"/>
-              <a:t>Balancing Mechanism</a:t>
+              <a:t>Modeling - Proposed Balancing Mechanism</a:t>
             </a:r>
             <a:endParaRPr lang="en-US" sz="2800" dirty="0"/>
           </a:p>
@@ -20237,13 +20649,13 @@
       </p:sp>
       <p:sp>
         <p:nvSpPr>
-          <p:cNvPr id="11" name="TextBox 10"/>
+          <p:cNvPr id="12" name="TextBox 11"/>
           <p:cNvSpPr txBox="1"/>
           <p:nvPr/>
         </p:nvSpPr>
         <p:spPr>
           <a:xfrm>
-            <a:off x="1066800" y="2891135"/>
+            <a:off x="1066798" y="3198167"/>
             <a:ext cx="8068627" cy="461665"/>
           </a:xfrm>
           <a:prstGeom prst="rect">
@@ -20259,19 +20671,19 @@
           <a:p>
             <a:r>
               <a:rPr lang="en-US" sz="2400" b="1" dirty="0" smtClean="0"/>
-              <a:t>STAGE 2</a:t>
+              <a:t>STAGE </a:t>
+            </a:r>
+            <a:r>
+              <a:rPr lang="en-US" sz="2400" b="1" dirty="0" smtClean="0"/>
+              <a:t>2</a:t>
             </a:r>
             <a:r>
               <a:rPr lang="en-US" sz="2400" dirty="0" smtClean="0"/>
-              <a:t>: NI </a:t>
-            </a:r>
-            <a:r>
-              <a:rPr lang="en-US" sz="2400" dirty="0" err="1" smtClean="0"/>
-              <a:t>CompactRIO</a:t>
+              <a:t>: </a:t>
             </a:r>
             <a:r>
               <a:rPr lang="en-US" sz="2400" dirty="0" smtClean="0"/>
-              <a:t> Real-Time Controller</a:t>
+              <a:t>State Space Control Design</a:t>
             </a:r>
             <a:endParaRPr lang="en-US" sz="2400" dirty="0"/>
           </a:p>
@@ -20279,13 +20691,13 @@
       </p:sp>
       <p:sp>
         <p:nvSpPr>
-          <p:cNvPr id="12" name="TextBox 11"/>
+          <p:cNvPr id="13" name="TextBox 12"/>
           <p:cNvSpPr txBox="1"/>
           <p:nvPr/>
         </p:nvSpPr>
         <p:spPr>
           <a:xfrm>
-            <a:off x="1066800" y="3881735"/>
+            <a:off x="1066800" y="4410669"/>
             <a:ext cx="8068627" cy="461665"/>
           </a:xfrm>
           <a:prstGeom prst="rect">
@@ -20301,11 +20713,27 @@
           <a:p>
             <a:r>
               <a:rPr lang="en-US" sz="2400" b="1" dirty="0" smtClean="0"/>
-              <a:t>STAGE 3</a:t>
+              <a:t>STAGE </a:t>
+            </a:r>
+            <a:r>
+              <a:rPr lang="en-US" sz="2400" b="1" dirty="0" smtClean="0"/>
+              <a:t>3</a:t>
             </a:r>
             <a:r>
               <a:rPr lang="en-US" sz="2400" dirty="0" smtClean="0"/>
-              <a:t>: State Space Control Design</a:t>
+              <a:t>: </a:t>
+            </a:r>
+            <a:r>
+              <a:rPr lang="en-US" sz="2400" dirty="0"/>
+              <a:t>NI </a:t>
+            </a:r>
+            <a:r>
+              <a:rPr lang="en-US" sz="2400" dirty="0" err="1"/>
+              <a:t>CompactRIO</a:t>
+            </a:r>
+            <a:r>
+              <a:rPr lang="en-US" sz="2400" dirty="0"/>
+              <a:t> Real-Time Controller</a:t>
             </a:r>
             <a:endParaRPr lang="en-US" sz="2400" dirty="0"/>
           </a:p>
@@ -20313,13 +20741,13 @@
       </p:sp>
       <p:sp>
         <p:nvSpPr>
-          <p:cNvPr id="13" name="TextBox 12"/>
+          <p:cNvPr id="14" name="TextBox 13"/>
           <p:cNvSpPr txBox="1"/>
           <p:nvPr/>
         </p:nvSpPr>
         <p:spPr>
           <a:xfrm>
-            <a:off x="1066800" y="4872335"/>
+            <a:off x="1066800" y="5715000"/>
             <a:ext cx="8068627" cy="461665"/>
           </a:xfrm>
           <a:prstGeom prst="rect">
@@ -20335,45 +20763,19 @@
           <a:p>
             <a:r>
               <a:rPr lang="en-US" sz="2400" b="1" dirty="0" smtClean="0"/>
-              <a:t>STAGE 4</a:t>
+              <a:t>STAGE </a:t>
+            </a:r>
+            <a:r>
+              <a:rPr lang="en-US" sz="2400" b="1" dirty="0" smtClean="0"/>
+              <a:t>4</a:t>
             </a:r>
             <a:r>
               <a:rPr lang="en-US" sz="2400" dirty="0" smtClean="0"/>
-              <a:t>: Robot Construction</a:t>
-            </a:r>
-            <a:endParaRPr lang="en-US" sz="2400" dirty="0"/>
-          </a:p>
-        </p:txBody>
-      </p:sp>
-      <p:sp>
-        <p:nvSpPr>
-          <p:cNvPr id="14" name="TextBox 13"/>
-          <p:cNvSpPr txBox="1"/>
-          <p:nvPr/>
-        </p:nvSpPr>
-        <p:spPr>
-          <a:xfrm>
-            <a:off x="1066800" y="5791200"/>
-            <a:ext cx="8068627" cy="461665"/>
-          </a:xfrm>
-          <a:prstGeom prst="rect">
-            <a:avLst/>
-          </a:prstGeom>
-          <a:noFill/>
-        </p:spPr>
-        <p:txBody>
-          <a:bodyPr wrap="square" rtlCol="0">
-            <a:spAutoFit/>
-          </a:bodyPr>
-          <a:lstStyle/>
-          <a:p>
-            <a:r>
-              <a:rPr lang="en-US" sz="2400" b="1" dirty="0" smtClean="0"/>
-              <a:t>STAGE 5</a:t>
+              <a:t>: </a:t>
             </a:r>
             <a:r>
               <a:rPr lang="en-US" sz="2400" dirty="0" smtClean="0"/>
-              <a:t>: Integration &amp; Debugging</a:t>
+              <a:t>Integration &amp; Debugging</a:t>
             </a:r>
             <a:endParaRPr lang="en-US" sz="2400" dirty="0"/>
           </a:p>
@@ -20468,7 +20870,7 @@
                                           </p:stCondLst>
                                         </p:cTn>
                                         <p:tgtEl>
-                                          <p:spTgt spid="11"/>
+                                          <p:spTgt spid="12"/>
                                         </p:tgtEl>
                                         <p:attrNameLst>
                                           <p:attrName>style.visibility</p:attrName>
@@ -20513,7 +20915,7 @@
                                           </p:stCondLst>
                                         </p:cTn>
                                         <p:tgtEl>
-                                          <p:spTgt spid="12"/>
+                                          <p:spTgt spid="13"/>
                                         </p:tgtEl>
                                         <p:attrNameLst>
                                           <p:attrName>style.visibility</p:attrName>
@@ -20553,51 +20955,6 @@
                                     <p:set>
                                       <p:cBhvr>
                                         <p:cTn id="18" dur="1" fill="hold">
-                                          <p:stCondLst>
-                                            <p:cond delay="0"/>
-                                          </p:stCondLst>
-                                        </p:cTn>
-                                        <p:tgtEl>
-                                          <p:spTgt spid="13"/>
-                                        </p:tgtEl>
-                                        <p:attrNameLst>
-                                          <p:attrName>style.visibility</p:attrName>
-                                        </p:attrNameLst>
-                                      </p:cBhvr>
-                                      <p:to>
-                                        <p:strVal val="visible"/>
-                                      </p:to>
-                                    </p:set>
-                                  </p:childTnLst>
-                                </p:cTn>
-                              </p:par>
-                            </p:childTnLst>
-                          </p:cTn>
-                        </p:par>
-                      </p:childTnLst>
-                    </p:cTn>
-                  </p:par>
-                  <p:par>
-                    <p:cTn id="19" fill="hold">
-                      <p:stCondLst>
-                        <p:cond delay="indefinite"/>
-                      </p:stCondLst>
-                      <p:childTnLst>
-                        <p:par>
-                          <p:cTn id="20" fill="hold">
-                            <p:stCondLst>
-                              <p:cond delay="0"/>
-                            </p:stCondLst>
-                            <p:childTnLst>
-                              <p:par>
-                                <p:cTn id="21" presetID="1" presetClass="entr" presetSubtype="0" fill="hold" grpId="0" nodeType="clickEffect">
-                                  <p:stCondLst>
-                                    <p:cond delay="0"/>
-                                  </p:stCondLst>
-                                  <p:childTnLst>
-                                    <p:set>
-                                      <p:cBhvr>
-                                        <p:cTn id="22" dur="1" fill="hold">
                                           <p:stCondLst>
                                             <p:cond delay="0"/>
                                           </p:stCondLst>
@@ -20645,7 +21002,6 @@
     </p:tnLst>
     <p:bldLst>
       <p:bldP spid="10" grpId="0"/>
-      <p:bldP spid="11" grpId="0"/>
       <p:bldP spid="12" grpId="0"/>
       <p:bldP spid="13" grpId="0"/>
       <p:bldP spid="14" grpId="0"/>
@@ -22270,70 +22626,6 @@
           </a:p>
         </p:txBody>
       </p:sp>
-      <p:pic>
-        <p:nvPicPr>
-          <p:cNvPr id="2050" name="Picture 2"/>
-          <p:cNvPicPr>
-            <a:picLocks noChangeAspect="1" noChangeArrowheads="1"/>
-          </p:cNvPicPr>
-          <p:nvPr/>
-        </p:nvPicPr>
-        <p:blipFill>
-          <a:blip r:embed="rId4">
-            <a:extLst>
-              <a:ext uri="{28A0092B-C50C-407E-A947-70E740481C1C}">
-                <a14:useLocalDpi xmlns:a14="http://schemas.microsoft.com/office/drawing/2010/main" val="0"/>
-              </a:ext>
-            </a:extLst>
-          </a:blip>
-          <a:srcRect/>
-          <a:stretch>
-            <a:fillRect/>
-          </a:stretch>
-        </p:blipFill>
-        <p:spPr bwMode="auto">
-          <a:xfrm>
-            <a:off x="304800" y="1447800"/>
-            <a:ext cx="8686800" cy="5102225"/>
-          </a:xfrm>
-          <a:prstGeom prst="rect">
-            <a:avLst/>
-          </a:prstGeom>
-          <a:noFill/>
-          <a:ln>
-            <a:noFill/>
-          </a:ln>
-          <a:effectLst/>
-          <a:extLst>
-            <a:ext uri="{909E8E84-426E-40DD-AFC4-6F175D3DCCD1}">
-              <a14:hiddenFill xmlns:a14="http://schemas.microsoft.com/office/drawing/2010/main">
-                <a:solidFill>
-                  <a:schemeClr val="accent1"/>
-                </a:solidFill>
-              </a14:hiddenFill>
-            </a:ext>
-            <a:ext uri="{91240B29-F687-4F45-9708-019B960494DF}">
-              <a14:hiddenLine xmlns:a14="http://schemas.microsoft.com/office/drawing/2010/main" w="9525">
-                <a:solidFill>
-                  <a:schemeClr val="tx1"/>
-                </a:solidFill>
-                <a:miter lim="800000"/>
-                <a:headEnd/>
-                <a:tailEnd/>
-              </a14:hiddenLine>
-            </a:ext>
-            <a:ext uri="{AF507438-7753-43E0-B8FC-AC1667EBCBE1}">
-              <a14:hiddenEffects xmlns:a14="http://schemas.microsoft.com/office/drawing/2010/main">
-                <a:effectLst>
-                  <a:outerShdw dist="35921" dir="2700000" algn="ctr" rotWithShape="0">
-                    <a:schemeClr val="bg2"/>
-                  </a:outerShdw>
-                </a:effectLst>
-              </a14:hiddenEffects>
-            </a:ext>
-          </a:extLst>
-        </p:spPr>
-      </p:pic>
       <p:sp>
         <p:nvSpPr>
           <p:cNvPr id="3" name="TextBox 2"/>
@@ -22364,6 +22656,54 @@
           </a:p>
         </p:txBody>
       </p:sp>
+      <p:graphicFrame>
+        <p:nvGraphicFramePr>
+          <p:cNvPr id="11" name="Chart 10"/>
+          <p:cNvGraphicFramePr>
+            <a:graphicFrameLocks/>
+          </p:cNvGraphicFramePr>
+          <p:nvPr>
+            <p:extLst>
+              <p:ext uri="{D42A27DB-BD31-4B8C-83A1-F6EECF244321}">
+                <p14:modId xmlns:p14="http://schemas.microsoft.com/office/powerpoint/2010/main" val="3975073617"/>
+              </p:ext>
+            </p:extLst>
+          </p:nvPr>
+        </p:nvGraphicFramePr>
+        <p:xfrm>
+          <a:off x="601028" y="1641677"/>
+          <a:ext cx="8534399" cy="4724400"/>
+        </p:xfrm>
+        <a:graphic>
+          <a:graphicData uri="http://schemas.openxmlformats.org/drawingml/2006/chart">
+            <c:chart xmlns:c="http://schemas.openxmlformats.org/drawingml/2006/chart" xmlns:r="http://schemas.openxmlformats.org/officeDocument/2006/relationships" r:id="rId4"/>
+          </a:graphicData>
+        </a:graphic>
+      </p:graphicFrame>
+      <p:graphicFrame>
+        <p:nvGraphicFramePr>
+          <p:cNvPr id="14" name="Chart 13"/>
+          <p:cNvGraphicFramePr>
+            <a:graphicFrameLocks/>
+          </p:cNvGraphicFramePr>
+          <p:nvPr>
+            <p:extLst>
+              <p:ext uri="{D42A27DB-BD31-4B8C-83A1-F6EECF244321}">
+                <p14:modId xmlns:p14="http://schemas.microsoft.com/office/powerpoint/2010/main" val="3059565832"/>
+              </p:ext>
+            </p:extLst>
+          </p:nvPr>
+        </p:nvGraphicFramePr>
+        <p:xfrm>
+          <a:off x="1295400" y="1647855"/>
+          <a:ext cx="7086600" cy="4718222"/>
+        </p:xfrm>
+        <a:graphic>
+          <a:graphicData uri="http://schemas.openxmlformats.org/drawingml/2006/chart">
+            <c:chart xmlns:c="http://schemas.openxmlformats.org/drawingml/2006/chart" xmlns:r="http://schemas.openxmlformats.org/officeDocument/2006/relationships" r:id="rId5"/>
+          </a:graphicData>
+        </a:graphic>
+      </p:graphicFrame>
     </p:spTree>
     <p:extLst>
       <p:ext uri="{BB962C8B-B14F-4D97-AF65-F5344CB8AC3E}">
@@ -22377,9 +22717,120 @@
   <p:timing>
     <p:tnLst>
       <p:par>
-        <p:cTn id="1" dur="indefinite" restart="never" nodeType="tmRoot"/>
+        <p:cTn id="1" dur="indefinite" restart="never" nodeType="tmRoot">
+          <p:childTnLst>
+            <p:seq concurrent="1" nextAc="seek">
+              <p:cTn id="2" dur="indefinite" nodeType="mainSeq">
+                <p:childTnLst>
+                  <p:par>
+                    <p:cTn id="3" fill="hold">
+                      <p:stCondLst>
+                        <p:cond delay="indefinite"/>
+                      </p:stCondLst>
+                      <p:childTnLst>
+                        <p:par>
+                          <p:cTn id="4" fill="hold">
+                            <p:stCondLst>
+                              <p:cond delay="0"/>
+                            </p:stCondLst>
+                            <p:childTnLst>
+                              <p:par>
+                                <p:cTn id="5" presetID="1" presetClass="exit" presetSubtype="0" fill="hold" grpId="0" nodeType="clickEffect">
+                                  <p:stCondLst>
+                                    <p:cond delay="0"/>
+                                  </p:stCondLst>
+                                  <p:childTnLst>
+                                    <p:set>
+                                      <p:cBhvr>
+                                        <p:cTn id="6" dur="1" fill="hold">
+                                          <p:stCondLst>
+                                            <p:cond delay="0"/>
+                                          </p:stCondLst>
+                                        </p:cTn>
+                                        <p:tgtEl>
+                                          <p:spTgt spid="11"/>
+                                        </p:tgtEl>
+                                        <p:attrNameLst>
+                                          <p:attrName>style.visibility</p:attrName>
+                                        </p:attrNameLst>
+                                      </p:cBhvr>
+                                      <p:to>
+                                        <p:strVal val="hidden"/>
+                                      </p:to>
+                                    </p:set>
+                                  </p:childTnLst>
+                                </p:cTn>
+                              </p:par>
+                              <p:par>
+                                <p:cTn id="7" presetID="10" presetClass="entr" presetSubtype="0" fill="hold" grpId="0" nodeType="withEffect">
+                                  <p:stCondLst>
+                                    <p:cond delay="0"/>
+                                  </p:stCondLst>
+                                  <p:childTnLst>
+                                    <p:set>
+                                      <p:cBhvr>
+                                        <p:cTn id="8" dur="1" fill="hold">
+                                          <p:stCondLst>
+                                            <p:cond delay="0"/>
+                                          </p:stCondLst>
+                                        </p:cTn>
+                                        <p:tgtEl>
+                                          <p:spTgt spid="14"/>
+                                        </p:tgtEl>
+                                        <p:attrNameLst>
+                                          <p:attrName>style.visibility</p:attrName>
+                                        </p:attrNameLst>
+                                      </p:cBhvr>
+                                      <p:to>
+                                        <p:strVal val="visible"/>
+                                      </p:to>
+                                    </p:set>
+                                    <p:animEffect transition="in" filter="fade">
+                                      <p:cBhvr>
+                                        <p:cTn id="9" dur="500"/>
+                                        <p:tgtEl>
+                                          <p:spTgt spid="14"/>
+                                        </p:tgtEl>
+                                      </p:cBhvr>
+                                    </p:animEffect>
+                                  </p:childTnLst>
+                                </p:cTn>
+                              </p:par>
+                            </p:childTnLst>
+                          </p:cTn>
+                        </p:par>
+                      </p:childTnLst>
+                    </p:cTn>
+                  </p:par>
+                </p:childTnLst>
+              </p:cTn>
+              <p:prevCondLst>
+                <p:cond evt="onPrev" delay="0">
+                  <p:tgtEl>
+                    <p:sldTgt/>
+                  </p:tgtEl>
+                </p:cond>
+              </p:prevCondLst>
+              <p:nextCondLst>
+                <p:cond evt="onNext" delay="0">
+                  <p:tgtEl>
+                    <p:sldTgt/>
+                  </p:tgtEl>
+                </p:cond>
+              </p:nextCondLst>
+            </p:seq>
+          </p:childTnLst>
+        </p:cTn>
       </p:par>
     </p:tnLst>
+    <p:bldLst>
+      <p:bldGraphic spid="11" grpId="0">
+        <p:bldAsOne/>
+      </p:bldGraphic>
+      <p:bldGraphic spid="14" grpId="0">
+        <p:bldAsOne/>
+      </p:bldGraphic>
+    </p:bldLst>
   </p:timing>
 </p:sld>
 </file>
@@ -22634,7 +23085,11 @@
           <a:p>
             <a:r>
               <a:rPr lang="en-US" sz="2800" dirty="0" smtClean="0"/>
-              <a:t>Project Plan – Critical Parts</a:t>
+              <a:t>Project Plan – </a:t>
+            </a:r>
+            <a:r>
+              <a:rPr lang="en-US" sz="2800" dirty="0" smtClean="0"/>
+              <a:t>Electrical Components</a:t>
             </a:r>
             <a:endParaRPr lang="en-US" sz="2800" dirty="0"/>
           </a:p>

</xml_diff>

<commit_message>
Fix some other power point issues.
</commit_message>
<xml_diff>
--- a/Documentation/Design Reviews/Design Review 1.pptx
+++ b/Documentation/Design Reviews/Design Review 1.pptx
@@ -1669,30 +1669,30 @@
     </dgm:pt>
   </dgm:ptLst>
   <dgm:cxnLst>
+    <dgm:cxn modelId="{86581E74-C593-4A2D-BD5E-CE1BC5CC7E25}" srcId="{20BE8E71-F497-468A-8BCF-867CD172525E}" destId="{8F9A3036-4F59-4DA9-BC69-9C65CC5FF756}" srcOrd="2" destOrd="0" parTransId="{2CAD2807-D227-4017-ADAE-4A618EC18CA1}" sibTransId="{37768D46-5764-48A9-B061-92B3238D2032}"/>
+    <dgm:cxn modelId="{26F7855D-5015-4F58-ADC8-48ABC6F68CC6}" type="presOf" srcId="{CDB2F97C-D222-4B7B-AD17-9B1FCACAE65F}" destId="{946220FF-E030-4205-92BF-46A67B7F2879}" srcOrd="0" destOrd="0" presId="urn:microsoft.com/office/officeart/2008/layout/RadialCluster"/>
     <dgm:cxn modelId="{3315D23B-2CFF-4564-8C5B-949FBD8DF287}" type="presOf" srcId="{4C1B39BF-F010-4321-A742-3FBC32925276}" destId="{47177BF1-5F2D-48EF-8497-21FE3FD9FE79}" srcOrd="0" destOrd="0" presId="urn:microsoft.com/office/officeart/2008/layout/RadialCluster"/>
+    <dgm:cxn modelId="{6A2E968B-2B00-4302-9A51-BA269571DA50}" type="presOf" srcId="{8E16C110-46DD-418E-B68B-41176C7363CB}" destId="{0B933785-8F10-4908-A031-95865622E3A9}" srcOrd="0" destOrd="0" presId="urn:microsoft.com/office/officeart/2008/layout/RadialCluster"/>
+    <dgm:cxn modelId="{0BB6BE93-6D07-4673-BD6D-65D3ADF9CEC3}" type="presOf" srcId="{2F4CBA2C-CAAA-42CF-B78F-87DEEF1B277A}" destId="{F3FFE5E4-1BC0-4B54-81AE-AA579CAF2653}" srcOrd="0" destOrd="0" presId="urn:microsoft.com/office/officeart/2008/layout/RadialCluster"/>
+    <dgm:cxn modelId="{A3229B7A-98F5-4A02-B1BC-20C1B2FD93E3}" srcId="{20BE8E71-F497-468A-8BCF-867CD172525E}" destId="{CDB2F97C-D222-4B7B-AD17-9B1FCACAE65F}" srcOrd="5" destOrd="0" parTransId="{6D930E7D-F4CB-4AC6-8B6C-E671E00D2CDA}" sibTransId="{3DB89215-6E3B-42AE-A1CB-3027719161AB}"/>
+    <dgm:cxn modelId="{CBD0D219-0D1F-4AD5-9833-EB8FF4BB68DE}" type="presOf" srcId="{A582B7BA-4838-4A95-B337-9DB7268116E5}" destId="{6A9A5629-B80C-4D13-8A9A-8E0030CA29C6}" srcOrd="0" destOrd="0" presId="urn:microsoft.com/office/officeart/2008/layout/RadialCluster"/>
     <dgm:cxn modelId="{93F051FE-4DAD-4282-B99F-B0F7FF420B95}" srcId="{20BE8E71-F497-468A-8BCF-867CD172525E}" destId="{73692DD7-5A4E-48BB-B470-C5A4DA4EC749}" srcOrd="4" destOrd="0" parTransId="{8E16C110-46DD-418E-B68B-41176C7363CB}" sibTransId="{F993AD63-E991-4E38-8297-04B334507A7E}"/>
+    <dgm:cxn modelId="{F93764F6-6CF4-486A-B088-61AFCBE74DDC}" type="presOf" srcId="{4231E3A6-8236-41B8-8CD9-63D77671A4C8}" destId="{FB5C7847-0F50-42C0-A98F-6F92FFC53D0B}" srcOrd="0" destOrd="0" presId="urn:microsoft.com/office/officeart/2008/layout/RadialCluster"/>
+    <dgm:cxn modelId="{8C68F102-B0A2-4886-87E1-F9FB7D1B138B}" srcId="{20BE8E71-F497-468A-8BCF-867CD172525E}" destId="{BD98ED33-66DC-415F-9A6F-2546BAAF3B3D}" srcOrd="1" destOrd="0" parTransId="{14D5249F-26A5-4564-AB2D-600D54F71173}" sibTransId="{33D01D21-955E-4F24-A18E-4041C0D6DE2B}"/>
     <dgm:cxn modelId="{9801DC9E-87CA-482B-BEFD-C61AA9E8153B}" type="presOf" srcId="{8F9A3036-4F59-4DA9-BC69-9C65CC5FF756}" destId="{4F1D4343-F068-4E09-A4D6-84538D008E3A}" srcOrd="0" destOrd="0" presId="urn:microsoft.com/office/officeart/2008/layout/RadialCluster"/>
+    <dgm:cxn modelId="{592CB8F0-757C-454F-820C-9ECAD0BA8C6C}" type="presOf" srcId="{23159B30-BD23-4DDD-8C73-F4E0AA557D76}" destId="{52F0F047-BCCC-42EF-9CAE-76E3CB0C88BA}" srcOrd="0" destOrd="0" presId="urn:microsoft.com/office/officeart/2008/layout/RadialCluster"/>
     <dgm:cxn modelId="{C2859883-5757-46E9-8E4F-5E8DE07FE54E}" srcId="{20BE8E71-F497-468A-8BCF-867CD172525E}" destId="{4C1B39BF-F010-4321-A742-3FBC32925276}" srcOrd="6" destOrd="0" parTransId="{4231E3A6-8236-41B8-8CD9-63D77671A4C8}" sibTransId="{5200D3A7-3CAD-44FB-B8C1-9407EA7D36E6}"/>
+    <dgm:cxn modelId="{122508DC-A576-4A03-83E4-985FEF1A8B82}" srcId="{20BE8E71-F497-468A-8BCF-867CD172525E}" destId="{A582B7BA-4838-4A95-B337-9DB7268116E5}" srcOrd="3" destOrd="0" parTransId="{36786B02-748A-4748-B2D4-5874F7413149}" sibTransId="{4C297DF1-AEBE-4A83-A484-A60056753F8A}"/>
+    <dgm:cxn modelId="{C5384FD1-877F-4593-8247-FA395F924F75}" type="presOf" srcId="{14D5249F-26A5-4564-AB2D-600D54F71173}" destId="{B84AF4A8-3947-45EA-8993-17FEB967E4E7}" srcOrd="0" destOrd="0" presId="urn:microsoft.com/office/officeart/2008/layout/RadialCluster"/>
     <dgm:cxn modelId="{37D790B7-A6B2-486C-AC56-3F127FDFC93D}" type="presOf" srcId="{2CAD2807-D227-4017-ADAE-4A618EC18CA1}" destId="{3C9F8E07-2750-4F18-8439-C39435BC2A48}" srcOrd="0" destOrd="0" presId="urn:microsoft.com/office/officeart/2008/layout/RadialCluster"/>
-    <dgm:cxn modelId="{CBD0D219-0D1F-4AD5-9833-EB8FF4BB68DE}" type="presOf" srcId="{A582B7BA-4838-4A95-B337-9DB7268116E5}" destId="{6A9A5629-B80C-4D13-8A9A-8E0030CA29C6}" srcOrd="0" destOrd="0" presId="urn:microsoft.com/office/officeart/2008/layout/RadialCluster"/>
     <dgm:cxn modelId="{84A1FB9D-2A24-4CE0-84DB-F1DA371028CC}" srcId="{2F4CBA2C-CAAA-42CF-B78F-87DEEF1B277A}" destId="{20BE8E71-F497-468A-8BCF-867CD172525E}" srcOrd="0" destOrd="0" parTransId="{10E7CD52-C70D-4B0D-BA73-39E7D6E0C441}" sibTransId="{C709E9FE-A76B-44F6-BBD4-8043D15198BD}"/>
-    <dgm:cxn modelId="{A3229B7A-98F5-4A02-B1BC-20C1B2FD93E3}" srcId="{20BE8E71-F497-468A-8BCF-867CD172525E}" destId="{CDB2F97C-D222-4B7B-AD17-9B1FCACAE65F}" srcOrd="5" destOrd="0" parTransId="{6D930E7D-F4CB-4AC6-8B6C-E671E00D2CDA}" sibTransId="{3DB89215-6E3B-42AE-A1CB-3027719161AB}"/>
+    <dgm:cxn modelId="{CB4208AA-8711-4B6B-B368-C5B8083D375F}" type="presOf" srcId="{6D930E7D-F4CB-4AC6-8B6C-E671E00D2CDA}" destId="{B5E74FB8-825C-4828-9A1C-A241752DC65C}" srcOrd="0" destOrd="0" presId="urn:microsoft.com/office/officeart/2008/layout/RadialCluster"/>
+    <dgm:cxn modelId="{0E26857C-86C4-4BCD-9F66-26E63A1CA80C}" type="presOf" srcId="{BD98ED33-66DC-415F-9A6F-2546BAAF3B3D}" destId="{323636B3-28E9-4D84-9B24-4CA99FA81ACE}" srcOrd="0" destOrd="0" presId="urn:microsoft.com/office/officeart/2008/layout/RadialCluster"/>
+    <dgm:cxn modelId="{61CD37EC-E091-4684-BA08-16DEF43099BB}" type="presOf" srcId="{7EA5189C-8A82-4E31-B8DE-1A2F0B8D4C54}" destId="{C2CB6F57-0576-413F-A293-A0E78B21B9F8}" srcOrd="0" destOrd="0" presId="urn:microsoft.com/office/officeart/2008/layout/RadialCluster"/>
+    <dgm:cxn modelId="{985F22C7-0E7D-42A9-953C-A246EBC99718}" srcId="{20BE8E71-F497-468A-8BCF-867CD172525E}" destId="{23159B30-BD23-4DDD-8C73-F4E0AA557D76}" srcOrd="0" destOrd="0" parTransId="{7EA5189C-8A82-4E31-B8DE-1A2F0B8D4C54}" sibTransId="{F4542481-DB3E-488C-ACCA-3E4EB5875099}"/>
+    <dgm:cxn modelId="{137A4AF1-06F5-4D8A-8F96-21F19B99C142}" type="presOf" srcId="{73692DD7-5A4E-48BB-B470-C5A4DA4EC749}" destId="{42C18C40-B4AA-446C-B562-40C2969136A5}" srcOrd="0" destOrd="0" presId="urn:microsoft.com/office/officeart/2008/layout/RadialCluster"/>
     <dgm:cxn modelId="{687A8EDA-2547-4B66-A2DF-5F77F1D17C87}" type="presOf" srcId="{20BE8E71-F497-468A-8BCF-867CD172525E}" destId="{EA7B28CB-2911-4779-869A-AEC78C5F1671}" srcOrd="0" destOrd="0" presId="urn:microsoft.com/office/officeart/2008/layout/RadialCluster"/>
-    <dgm:cxn modelId="{0BB6BE93-6D07-4673-BD6D-65D3ADF9CEC3}" type="presOf" srcId="{2F4CBA2C-CAAA-42CF-B78F-87DEEF1B277A}" destId="{F3FFE5E4-1BC0-4B54-81AE-AA579CAF2653}" srcOrd="0" destOrd="0" presId="urn:microsoft.com/office/officeart/2008/layout/RadialCluster"/>
-    <dgm:cxn modelId="{8C68F102-B0A2-4886-87E1-F9FB7D1B138B}" srcId="{20BE8E71-F497-468A-8BCF-867CD172525E}" destId="{BD98ED33-66DC-415F-9A6F-2546BAAF3B3D}" srcOrd="1" destOrd="0" parTransId="{14D5249F-26A5-4564-AB2D-600D54F71173}" sibTransId="{33D01D21-955E-4F24-A18E-4041C0D6DE2B}"/>
-    <dgm:cxn modelId="{86581E74-C593-4A2D-BD5E-CE1BC5CC7E25}" srcId="{20BE8E71-F497-468A-8BCF-867CD172525E}" destId="{8F9A3036-4F59-4DA9-BC69-9C65CC5FF756}" srcOrd="2" destOrd="0" parTransId="{2CAD2807-D227-4017-ADAE-4A618EC18CA1}" sibTransId="{37768D46-5764-48A9-B061-92B3238D2032}"/>
-    <dgm:cxn modelId="{592CB8F0-757C-454F-820C-9ECAD0BA8C6C}" type="presOf" srcId="{23159B30-BD23-4DDD-8C73-F4E0AA557D76}" destId="{52F0F047-BCCC-42EF-9CAE-76E3CB0C88BA}" srcOrd="0" destOrd="0" presId="urn:microsoft.com/office/officeart/2008/layout/RadialCluster"/>
-    <dgm:cxn modelId="{985F22C7-0E7D-42A9-953C-A246EBC99718}" srcId="{20BE8E71-F497-468A-8BCF-867CD172525E}" destId="{23159B30-BD23-4DDD-8C73-F4E0AA557D76}" srcOrd="0" destOrd="0" parTransId="{7EA5189C-8A82-4E31-B8DE-1A2F0B8D4C54}" sibTransId="{F4542481-DB3E-488C-ACCA-3E4EB5875099}"/>
-    <dgm:cxn modelId="{0E26857C-86C4-4BCD-9F66-26E63A1CA80C}" type="presOf" srcId="{BD98ED33-66DC-415F-9A6F-2546BAAF3B3D}" destId="{323636B3-28E9-4D84-9B24-4CA99FA81ACE}" srcOrd="0" destOrd="0" presId="urn:microsoft.com/office/officeart/2008/layout/RadialCluster"/>
     <dgm:cxn modelId="{9AA18266-4943-45ED-A460-D5F91AC5B52E}" type="presOf" srcId="{36786B02-748A-4748-B2D4-5874F7413149}" destId="{F3A44B51-B4D8-4EB5-89F7-4849638C9113}" srcOrd="0" destOrd="0" presId="urn:microsoft.com/office/officeart/2008/layout/RadialCluster"/>
-    <dgm:cxn modelId="{C5384FD1-877F-4593-8247-FA395F924F75}" type="presOf" srcId="{14D5249F-26A5-4564-AB2D-600D54F71173}" destId="{B84AF4A8-3947-45EA-8993-17FEB967E4E7}" srcOrd="0" destOrd="0" presId="urn:microsoft.com/office/officeart/2008/layout/RadialCluster"/>
-    <dgm:cxn modelId="{6A2E968B-2B00-4302-9A51-BA269571DA50}" type="presOf" srcId="{8E16C110-46DD-418E-B68B-41176C7363CB}" destId="{0B933785-8F10-4908-A031-95865622E3A9}" srcOrd="0" destOrd="0" presId="urn:microsoft.com/office/officeart/2008/layout/RadialCluster"/>
-    <dgm:cxn modelId="{122508DC-A576-4A03-83E4-985FEF1A8B82}" srcId="{20BE8E71-F497-468A-8BCF-867CD172525E}" destId="{A582B7BA-4838-4A95-B337-9DB7268116E5}" srcOrd="3" destOrd="0" parTransId="{36786B02-748A-4748-B2D4-5874F7413149}" sibTransId="{4C297DF1-AEBE-4A83-A484-A60056753F8A}"/>
-    <dgm:cxn modelId="{F93764F6-6CF4-486A-B088-61AFCBE74DDC}" type="presOf" srcId="{4231E3A6-8236-41B8-8CD9-63D77671A4C8}" destId="{FB5C7847-0F50-42C0-A98F-6F92FFC53D0B}" srcOrd="0" destOrd="0" presId="urn:microsoft.com/office/officeart/2008/layout/RadialCluster"/>
-    <dgm:cxn modelId="{26F7855D-5015-4F58-ADC8-48ABC6F68CC6}" type="presOf" srcId="{CDB2F97C-D222-4B7B-AD17-9B1FCACAE65F}" destId="{946220FF-E030-4205-92BF-46A67B7F2879}" srcOrd="0" destOrd="0" presId="urn:microsoft.com/office/officeart/2008/layout/RadialCluster"/>
-    <dgm:cxn modelId="{CB4208AA-8711-4B6B-B368-C5B8083D375F}" type="presOf" srcId="{6D930E7D-F4CB-4AC6-8B6C-E671E00D2CDA}" destId="{B5E74FB8-825C-4828-9A1C-A241752DC65C}" srcOrd="0" destOrd="0" presId="urn:microsoft.com/office/officeart/2008/layout/RadialCluster"/>
-    <dgm:cxn modelId="{61CD37EC-E091-4684-BA08-16DEF43099BB}" type="presOf" srcId="{7EA5189C-8A82-4E31-B8DE-1A2F0B8D4C54}" destId="{C2CB6F57-0576-413F-A293-A0E78B21B9F8}" srcOrd="0" destOrd="0" presId="urn:microsoft.com/office/officeart/2008/layout/RadialCluster"/>
-    <dgm:cxn modelId="{137A4AF1-06F5-4D8A-8F96-21F19B99C142}" type="presOf" srcId="{73692DD7-5A4E-48BB-B470-C5A4DA4EC749}" destId="{42C18C40-B4AA-446C-B562-40C2969136A5}" srcOrd="0" destOrd="0" presId="urn:microsoft.com/office/officeart/2008/layout/RadialCluster"/>
     <dgm:cxn modelId="{BFFCAA7A-7A50-4032-9C89-D6620E9AD265}" type="presParOf" srcId="{F3FFE5E4-1BC0-4B54-81AE-AA579CAF2653}" destId="{B22068D3-DDED-4F7A-869F-113F94CC087D}" srcOrd="0" destOrd="0" presId="urn:microsoft.com/office/officeart/2008/layout/RadialCluster"/>
     <dgm:cxn modelId="{22E76D57-FA4B-4090-8D7B-637F59289991}" type="presParOf" srcId="{B22068D3-DDED-4F7A-869F-113F94CC087D}" destId="{EA7B28CB-2911-4779-869A-AEC78C5F1671}" srcOrd="0" destOrd="0" presId="urn:microsoft.com/office/officeart/2008/layout/RadialCluster"/>
     <dgm:cxn modelId="{C4FCDBE5-0DDD-44F7-B65C-D908399031A9}" type="presParOf" srcId="{B22068D3-DDED-4F7A-869F-113F94CC087D}" destId="{C2CB6F57-0576-413F-A293-A0E78B21B9F8}" srcOrd="1" destOrd="0" presId="urn:microsoft.com/office/officeart/2008/layout/RadialCluster"/>
@@ -8376,11 +8376,7 @@
             </a:pPr>
             <a:r>
               <a:rPr lang="en-US" baseline="0" dirty="0" smtClean="0"/>
-              <a:t>National Instruments has developed a full </a:t>
-            </a:r>
-            <a:r>
-              <a:rPr lang="en-US" baseline="0" dirty="0" smtClean="0"/>
-              <a:t>solution to solving challenging controls problems with real time components, and this project is meant to show how a challenging controls problem can be solved using their components.  </a:t>
+              <a:t>National Instruments has developed a full solution to solving challenging controls problems with real time components, and this project is meant to show how a challenging controls problem can be solved using their components.  </a:t>
             </a:r>
           </a:p>
           <a:p>
@@ -8433,7 +8429,6 @@
               <a:rPr lang="en-US" baseline="0" dirty="0" smtClean="0"/>
               <a:t>.</a:t>
             </a:r>
-            <a:endParaRPr lang="en-US" baseline="0" dirty="0" smtClean="0"/>
           </a:p>
           <a:p>
             <a:pPr marL="0" marR="0" indent="0" algn="l" defTabSz="914400" rtl="0" eaLnBrk="1" fontAlgn="auto" latinLnBrk="0" hangingPunct="1">
@@ -8911,7 +8906,6 @@
               <a:rPr lang="en-US" baseline="0" dirty="0" smtClean="0"/>
               <a:t> robotics environment simulator, and </a:t>
             </a:r>
-            <a:endParaRPr lang="en-US" baseline="0" dirty="0" smtClean="0"/>
           </a:p>
           <a:p>
             <a:pPr marL="0" marR="0" indent="0" algn="l" defTabSz="914400" rtl="0" eaLnBrk="1" fontAlgn="auto" latinLnBrk="0" hangingPunct="1">
@@ -8953,15 +8947,7 @@
             </a:pPr>
             <a:r>
               <a:rPr lang="en-US" baseline="0" dirty="0" smtClean="0"/>
-              <a:t>After we have an accurate model, we will develop </a:t>
-            </a:r>
-            <a:r>
-              <a:rPr lang="en-US" baseline="0" dirty="0" smtClean="0"/>
-              <a:t>our control algorithms </a:t>
-            </a:r>
-            <a:r>
-              <a:rPr lang="en-US" baseline="0" dirty="0" smtClean="0"/>
-              <a:t>within </a:t>
+              <a:t>After we have an accurate model, we will develop our control algorithms within </a:t>
             </a:r>
             <a:r>
               <a:rPr lang="en-US" baseline="0" dirty="0" err="1" smtClean="0"/>
@@ -8969,13 +8955,8 @@
             </a:r>
             <a:r>
               <a:rPr lang="en-US" baseline="0" dirty="0" smtClean="0"/>
-              <a:t> using </a:t>
-            </a:r>
-            <a:r>
-              <a:rPr lang="en-US" baseline="0" dirty="0" smtClean="0"/>
-              <a:t>the simulator.  </a:t>
-            </a:r>
-            <a:endParaRPr lang="en-US" baseline="0" dirty="0" smtClean="0"/>
+              <a:t> using the simulator.  </a:t>
+            </a:r>
           </a:p>
           <a:p>
             <a:pPr marL="0" marR="0" indent="0" algn="l" defTabSz="914400" rtl="0" eaLnBrk="1" fontAlgn="auto" latinLnBrk="0" hangingPunct="1">
@@ -9017,15 +8998,7 @@
             </a:pPr>
             <a:r>
               <a:rPr lang="en-US" baseline="0" dirty="0" smtClean="0"/>
-              <a:t>Once </a:t>
-            </a:r>
-            <a:r>
-              <a:rPr lang="en-US" baseline="0" dirty="0" smtClean="0"/>
-              <a:t>we are confident in our control algorithms, we will </a:t>
-            </a:r>
-            <a:r>
-              <a:rPr lang="en-US" baseline="0" dirty="0" smtClean="0"/>
-              <a:t>build a physical robot using a </a:t>
+              <a:t>Once we are confident in our control algorithms, we will build a physical robot using a </a:t>
             </a:r>
             <a:r>
               <a:rPr lang="en-US" baseline="0" dirty="0" err="1" smtClean="0"/>
@@ -9227,11 +9200,7 @@
             </a:pPr>
             <a:r>
               <a:rPr lang="en-US" dirty="0" smtClean="0"/>
-              <a:t>Here you can see our project plan.  </a:t>
-            </a:r>
-            <a:r>
-              <a:rPr lang="en-US" dirty="0" smtClean="0"/>
-              <a:t>The green line represents</a:t>
+              <a:t>Here you can see our project plan.  The green line represents</a:t>
             </a:r>
             <a:r>
               <a:rPr lang="en-US" baseline="0" dirty="0" smtClean="0"/>
@@ -20671,19 +20640,11 @@
           <a:p>
             <a:r>
               <a:rPr lang="en-US" sz="2400" b="1" dirty="0" smtClean="0"/>
-              <a:t>STAGE </a:t>
-            </a:r>
-            <a:r>
-              <a:rPr lang="en-US" sz="2400" b="1" dirty="0" smtClean="0"/>
-              <a:t>2</a:t>
+              <a:t>STAGE 2</a:t>
             </a:r>
             <a:r>
               <a:rPr lang="en-US" sz="2400" dirty="0" smtClean="0"/>
-              <a:t>: </a:t>
-            </a:r>
-            <a:r>
-              <a:rPr lang="en-US" sz="2400" dirty="0" smtClean="0"/>
-              <a:t>State Space Control Design</a:t>
+              <a:t>: State Space Control Design</a:t>
             </a:r>
             <a:endParaRPr lang="en-US" sz="2400" dirty="0"/>
           </a:p>
@@ -20713,11 +20674,7 @@
           <a:p>
             <a:r>
               <a:rPr lang="en-US" sz="2400" b="1" dirty="0" smtClean="0"/>
-              <a:t>STAGE </a:t>
-            </a:r>
-            <a:r>
-              <a:rPr lang="en-US" sz="2400" b="1" dirty="0" smtClean="0"/>
-              <a:t>3</a:t>
+              <a:t>STAGE 3</a:t>
             </a:r>
             <a:r>
               <a:rPr lang="en-US" sz="2400" dirty="0" smtClean="0"/>
@@ -20735,7 +20692,6 @@
               <a:rPr lang="en-US" sz="2400" dirty="0"/>
               <a:t> Real-Time Controller</a:t>
             </a:r>
-            <a:endParaRPr lang="en-US" sz="2400" dirty="0"/>
           </a:p>
         </p:txBody>
       </p:sp>
@@ -20763,19 +20719,11 @@
           <a:p>
             <a:r>
               <a:rPr lang="en-US" sz="2400" b="1" dirty="0" smtClean="0"/>
-              <a:t>STAGE </a:t>
-            </a:r>
-            <a:r>
-              <a:rPr lang="en-US" sz="2400" b="1" dirty="0" smtClean="0"/>
-              <a:t>4</a:t>
+              <a:t>STAGE 4</a:t>
             </a:r>
             <a:r>
               <a:rPr lang="en-US" sz="2400" dirty="0" smtClean="0"/>
-              <a:t>: </a:t>
-            </a:r>
-            <a:r>
-              <a:rPr lang="en-US" sz="2400" dirty="0" smtClean="0"/>
-              <a:t>Integration &amp; Debugging</a:t>
+              <a:t>: Integration &amp; Debugging</a:t>
             </a:r>
             <a:endParaRPr lang="en-US" sz="2400" dirty="0"/>
           </a:p>
@@ -22626,6 +22574,54 @@
           </a:p>
         </p:txBody>
       </p:sp>
+      <p:graphicFrame>
+        <p:nvGraphicFramePr>
+          <p:cNvPr id="11" name="Chart 10"/>
+          <p:cNvGraphicFramePr>
+            <a:graphicFrameLocks/>
+          </p:cNvGraphicFramePr>
+          <p:nvPr>
+            <p:extLst>
+              <p:ext uri="{D42A27DB-BD31-4B8C-83A1-F6EECF244321}">
+                <p14:modId xmlns:p14="http://schemas.microsoft.com/office/powerpoint/2010/main" val="3677042638"/>
+              </p:ext>
+            </p:extLst>
+          </p:nvPr>
+        </p:nvGraphicFramePr>
+        <p:xfrm>
+          <a:off x="601028" y="1412298"/>
+          <a:ext cx="8534399" cy="4724400"/>
+        </p:xfrm>
+        <a:graphic>
+          <a:graphicData uri="http://schemas.openxmlformats.org/drawingml/2006/chart">
+            <c:chart xmlns:c="http://schemas.openxmlformats.org/drawingml/2006/chart" xmlns:r="http://schemas.openxmlformats.org/officeDocument/2006/relationships" r:id="rId4"/>
+          </a:graphicData>
+        </a:graphic>
+      </p:graphicFrame>
+      <p:graphicFrame>
+        <p:nvGraphicFramePr>
+          <p:cNvPr id="14" name="Chart 13"/>
+          <p:cNvGraphicFramePr>
+            <a:graphicFrameLocks/>
+          </p:cNvGraphicFramePr>
+          <p:nvPr>
+            <p:extLst>
+              <p:ext uri="{D42A27DB-BD31-4B8C-83A1-F6EECF244321}">
+                <p14:modId xmlns:p14="http://schemas.microsoft.com/office/powerpoint/2010/main" val="93971895"/>
+              </p:ext>
+            </p:extLst>
+          </p:nvPr>
+        </p:nvGraphicFramePr>
+        <p:xfrm>
+          <a:off x="1295400" y="1447800"/>
+          <a:ext cx="7086600" cy="4718222"/>
+        </p:xfrm>
+        <a:graphic>
+          <a:graphicData uri="http://schemas.openxmlformats.org/drawingml/2006/chart">
+            <c:chart xmlns:c="http://schemas.openxmlformats.org/drawingml/2006/chart" xmlns:r="http://schemas.openxmlformats.org/officeDocument/2006/relationships" r:id="rId5"/>
+          </a:graphicData>
+        </a:graphic>
+      </p:graphicFrame>
       <p:sp>
         <p:nvSpPr>
           <p:cNvPr id="3" name="TextBox 2"/>
@@ -22656,54 +22652,6 @@
           </a:p>
         </p:txBody>
       </p:sp>
-      <p:graphicFrame>
-        <p:nvGraphicFramePr>
-          <p:cNvPr id="11" name="Chart 10"/>
-          <p:cNvGraphicFramePr>
-            <a:graphicFrameLocks/>
-          </p:cNvGraphicFramePr>
-          <p:nvPr>
-            <p:extLst>
-              <p:ext uri="{D42A27DB-BD31-4B8C-83A1-F6EECF244321}">
-                <p14:modId xmlns:p14="http://schemas.microsoft.com/office/powerpoint/2010/main" val="3975073617"/>
-              </p:ext>
-            </p:extLst>
-          </p:nvPr>
-        </p:nvGraphicFramePr>
-        <p:xfrm>
-          <a:off x="601028" y="1641677"/>
-          <a:ext cx="8534399" cy="4724400"/>
-        </p:xfrm>
-        <a:graphic>
-          <a:graphicData uri="http://schemas.openxmlformats.org/drawingml/2006/chart">
-            <c:chart xmlns:c="http://schemas.openxmlformats.org/drawingml/2006/chart" xmlns:r="http://schemas.openxmlformats.org/officeDocument/2006/relationships" r:id="rId4"/>
-          </a:graphicData>
-        </a:graphic>
-      </p:graphicFrame>
-      <p:graphicFrame>
-        <p:nvGraphicFramePr>
-          <p:cNvPr id="14" name="Chart 13"/>
-          <p:cNvGraphicFramePr>
-            <a:graphicFrameLocks/>
-          </p:cNvGraphicFramePr>
-          <p:nvPr>
-            <p:extLst>
-              <p:ext uri="{D42A27DB-BD31-4B8C-83A1-F6EECF244321}">
-                <p14:modId xmlns:p14="http://schemas.microsoft.com/office/powerpoint/2010/main" val="3059565832"/>
-              </p:ext>
-            </p:extLst>
-          </p:nvPr>
-        </p:nvGraphicFramePr>
-        <p:xfrm>
-          <a:off x="1295400" y="1647855"/>
-          <a:ext cx="7086600" cy="4718222"/>
-        </p:xfrm>
-        <a:graphic>
-          <a:graphicData uri="http://schemas.openxmlformats.org/drawingml/2006/chart">
-            <c:chart xmlns:c="http://schemas.openxmlformats.org/drawingml/2006/chart" xmlns:r="http://schemas.openxmlformats.org/officeDocument/2006/relationships" r:id="rId5"/>
-          </a:graphicData>
-        </a:graphic>
-      </p:graphicFrame>
     </p:spTree>
     <p:extLst>
       <p:ext uri="{BB962C8B-B14F-4D97-AF65-F5344CB8AC3E}">
@@ -22796,6 +22744,33 @@
                                   </p:childTnLst>
                                 </p:cTn>
                               </p:par>
+                              <p:par>
+                                <p:cTn id="10" presetID="1" presetClass="exit" presetSubtype="0" fill="hold" grpId="0" nodeType="withEffect">
+                                  <p:stCondLst>
+                                    <p:cond delay="0"/>
+                                  </p:stCondLst>
+                                  <p:childTnLst>
+                                    <p:set>
+                                      <p:cBhvr>
+                                        <p:cTn id="11" dur="1" fill="hold">
+                                          <p:stCondLst>
+                                            <p:cond delay="0"/>
+                                          </p:stCondLst>
+                                        </p:cTn>
+                                        <p:tgtEl>
+                                          <p:spTgt spid="3"/>
+                                        </p:tgtEl>
+                                        <p:attrNameLst>
+                                          <p:attrName>style.visibility</p:attrName>
+                                        </p:attrNameLst>
+                                      </p:cBhvr>
+                                      <p:to>
+                                        <p:strVal val="hidden"/>
+                                      </p:to>
+                                    </p:set>
+                                  </p:childTnLst>
+                                </p:cTn>
+                              </p:par>
                             </p:childTnLst>
                           </p:cTn>
                         </p:par>
@@ -22830,6 +22805,7 @@
       <p:bldGraphic spid="14" grpId="0">
         <p:bldAsOne/>
       </p:bldGraphic>
+      <p:bldP spid="3" grpId="0"/>
     </p:bldLst>
   </p:timing>
 </p:sld>
@@ -23085,11 +23061,7 @@
           <a:p>
             <a:r>
               <a:rPr lang="en-US" sz="2800" dirty="0" smtClean="0"/>
-              <a:t>Project Plan – </a:t>
-            </a:r>
-            <a:r>
-              <a:rPr lang="en-US" sz="2800" dirty="0" smtClean="0"/>
-              <a:t>Electrical Components</a:t>
+              <a:t>Project Plan – Electrical Components</a:t>
             </a:r>
             <a:endParaRPr lang="en-US" sz="2800" dirty="0"/>
           </a:p>

</xml_diff>

<commit_message>
Made another change to the slides.
</commit_message>
<xml_diff>
--- a/Documentation/Design Reviews/Design Review 1.pptx
+++ b/Documentation/Design Reviews/Design Review 1.pptx
@@ -1669,30 +1669,30 @@
     </dgm:pt>
   </dgm:ptLst>
   <dgm:cxnLst>
+    <dgm:cxn modelId="{3315D23B-2CFF-4564-8C5B-949FBD8DF287}" type="presOf" srcId="{4C1B39BF-F010-4321-A742-3FBC32925276}" destId="{47177BF1-5F2D-48EF-8497-21FE3FD9FE79}" srcOrd="0" destOrd="0" presId="urn:microsoft.com/office/officeart/2008/layout/RadialCluster"/>
+    <dgm:cxn modelId="{93F051FE-4DAD-4282-B99F-B0F7FF420B95}" srcId="{20BE8E71-F497-468A-8BCF-867CD172525E}" destId="{73692DD7-5A4E-48BB-B470-C5A4DA4EC749}" srcOrd="4" destOrd="0" parTransId="{8E16C110-46DD-418E-B68B-41176C7363CB}" sibTransId="{F993AD63-E991-4E38-8297-04B334507A7E}"/>
+    <dgm:cxn modelId="{9801DC9E-87CA-482B-BEFD-C61AA9E8153B}" type="presOf" srcId="{8F9A3036-4F59-4DA9-BC69-9C65CC5FF756}" destId="{4F1D4343-F068-4E09-A4D6-84538D008E3A}" srcOrd="0" destOrd="0" presId="urn:microsoft.com/office/officeart/2008/layout/RadialCluster"/>
+    <dgm:cxn modelId="{C2859883-5757-46E9-8E4F-5E8DE07FE54E}" srcId="{20BE8E71-F497-468A-8BCF-867CD172525E}" destId="{4C1B39BF-F010-4321-A742-3FBC32925276}" srcOrd="6" destOrd="0" parTransId="{4231E3A6-8236-41B8-8CD9-63D77671A4C8}" sibTransId="{5200D3A7-3CAD-44FB-B8C1-9407EA7D36E6}"/>
+    <dgm:cxn modelId="{37D790B7-A6B2-486C-AC56-3F127FDFC93D}" type="presOf" srcId="{2CAD2807-D227-4017-ADAE-4A618EC18CA1}" destId="{3C9F8E07-2750-4F18-8439-C39435BC2A48}" srcOrd="0" destOrd="0" presId="urn:microsoft.com/office/officeart/2008/layout/RadialCluster"/>
+    <dgm:cxn modelId="{CBD0D219-0D1F-4AD5-9833-EB8FF4BB68DE}" type="presOf" srcId="{A582B7BA-4838-4A95-B337-9DB7268116E5}" destId="{6A9A5629-B80C-4D13-8A9A-8E0030CA29C6}" srcOrd="0" destOrd="0" presId="urn:microsoft.com/office/officeart/2008/layout/RadialCluster"/>
+    <dgm:cxn modelId="{84A1FB9D-2A24-4CE0-84DB-F1DA371028CC}" srcId="{2F4CBA2C-CAAA-42CF-B78F-87DEEF1B277A}" destId="{20BE8E71-F497-468A-8BCF-867CD172525E}" srcOrd="0" destOrd="0" parTransId="{10E7CD52-C70D-4B0D-BA73-39E7D6E0C441}" sibTransId="{C709E9FE-A76B-44F6-BBD4-8043D15198BD}"/>
+    <dgm:cxn modelId="{A3229B7A-98F5-4A02-B1BC-20C1B2FD93E3}" srcId="{20BE8E71-F497-468A-8BCF-867CD172525E}" destId="{CDB2F97C-D222-4B7B-AD17-9B1FCACAE65F}" srcOrd="5" destOrd="0" parTransId="{6D930E7D-F4CB-4AC6-8B6C-E671E00D2CDA}" sibTransId="{3DB89215-6E3B-42AE-A1CB-3027719161AB}"/>
+    <dgm:cxn modelId="{687A8EDA-2547-4B66-A2DF-5F77F1D17C87}" type="presOf" srcId="{20BE8E71-F497-468A-8BCF-867CD172525E}" destId="{EA7B28CB-2911-4779-869A-AEC78C5F1671}" srcOrd="0" destOrd="0" presId="urn:microsoft.com/office/officeart/2008/layout/RadialCluster"/>
+    <dgm:cxn modelId="{0BB6BE93-6D07-4673-BD6D-65D3ADF9CEC3}" type="presOf" srcId="{2F4CBA2C-CAAA-42CF-B78F-87DEEF1B277A}" destId="{F3FFE5E4-1BC0-4B54-81AE-AA579CAF2653}" srcOrd="0" destOrd="0" presId="urn:microsoft.com/office/officeart/2008/layout/RadialCluster"/>
+    <dgm:cxn modelId="{8C68F102-B0A2-4886-87E1-F9FB7D1B138B}" srcId="{20BE8E71-F497-468A-8BCF-867CD172525E}" destId="{BD98ED33-66DC-415F-9A6F-2546BAAF3B3D}" srcOrd="1" destOrd="0" parTransId="{14D5249F-26A5-4564-AB2D-600D54F71173}" sibTransId="{33D01D21-955E-4F24-A18E-4041C0D6DE2B}"/>
     <dgm:cxn modelId="{86581E74-C593-4A2D-BD5E-CE1BC5CC7E25}" srcId="{20BE8E71-F497-468A-8BCF-867CD172525E}" destId="{8F9A3036-4F59-4DA9-BC69-9C65CC5FF756}" srcOrd="2" destOrd="0" parTransId="{2CAD2807-D227-4017-ADAE-4A618EC18CA1}" sibTransId="{37768D46-5764-48A9-B061-92B3238D2032}"/>
+    <dgm:cxn modelId="{592CB8F0-757C-454F-820C-9ECAD0BA8C6C}" type="presOf" srcId="{23159B30-BD23-4DDD-8C73-F4E0AA557D76}" destId="{52F0F047-BCCC-42EF-9CAE-76E3CB0C88BA}" srcOrd="0" destOrd="0" presId="urn:microsoft.com/office/officeart/2008/layout/RadialCluster"/>
+    <dgm:cxn modelId="{985F22C7-0E7D-42A9-953C-A246EBC99718}" srcId="{20BE8E71-F497-468A-8BCF-867CD172525E}" destId="{23159B30-BD23-4DDD-8C73-F4E0AA557D76}" srcOrd="0" destOrd="0" parTransId="{7EA5189C-8A82-4E31-B8DE-1A2F0B8D4C54}" sibTransId="{F4542481-DB3E-488C-ACCA-3E4EB5875099}"/>
+    <dgm:cxn modelId="{0E26857C-86C4-4BCD-9F66-26E63A1CA80C}" type="presOf" srcId="{BD98ED33-66DC-415F-9A6F-2546BAAF3B3D}" destId="{323636B3-28E9-4D84-9B24-4CA99FA81ACE}" srcOrd="0" destOrd="0" presId="urn:microsoft.com/office/officeart/2008/layout/RadialCluster"/>
+    <dgm:cxn modelId="{9AA18266-4943-45ED-A460-D5F91AC5B52E}" type="presOf" srcId="{36786B02-748A-4748-B2D4-5874F7413149}" destId="{F3A44B51-B4D8-4EB5-89F7-4849638C9113}" srcOrd="0" destOrd="0" presId="urn:microsoft.com/office/officeart/2008/layout/RadialCluster"/>
+    <dgm:cxn modelId="{C5384FD1-877F-4593-8247-FA395F924F75}" type="presOf" srcId="{14D5249F-26A5-4564-AB2D-600D54F71173}" destId="{B84AF4A8-3947-45EA-8993-17FEB967E4E7}" srcOrd="0" destOrd="0" presId="urn:microsoft.com/office/officeart/2008/layout/RadialCluster"/>
+    <dgm:cxn modelId="{6A2E968B-2B00-4302-9A51-BA269571DA50}" type="presOf" srcId="{8E16C110-46DD-418E-B68B-41176C7363CB}" destId="{0B933785-8F10-4908-A031-95865622E3A9}" srcOrd="0" destOrd="0" presId="urn:microsoft.com/office/officeart/2008/layout/RadialCluster"/>
+    <dgm:cxn modelId="{122508DC-A576-4A03-83E4-985FEF1A8B82}" srcId="{20BE8E71-F497-468A-8BCF-867CD172525E}" destId="{A582B7BA-4838-4A95-B337-9DB7268116E5}" srcOrd="3" destOrd="0" parTransId="{36786B02-748A-4748-B2D4-5874F7413149}" sibTransId="{4C297DF1-AEBE-4A83-A484-A60056753F8A}"/>
+    <dgm:cxn modelId="{F93764F6-6CF4-486A-B088-61AFCBE74DDC}" type="presOf" srcId="{4231E3A6-8236-41B8-8CD9-63D77671A4C8}" destId="{FB5C7847-0F50-42C0-A98F-6F92FFC53D0B}" srcOrd="0" destOrd="0" presId="urn:microsoft.com/office/officeart/2008/layout/RadialCluster"/>
     <dgm:cxn modelId="{26F7855D-5015-4F58-ADC8-48ABC6F68CC6}" type="presOf" srcId="{CDB2F97C-D222-4B7B-AD17-9B1FCACAE65F}" destId="{946220FF-E030-4205-92BF-46A67B7F2879}" srcOrd="0" destOrd="0" presId="urn:microsoft.com/office/officeart/2008/layout/RadialCluster"/>
-    <dgm:cxn modelId="{3315D23B-2CFF-4564-8C5B-949FBD8DF287}" type="presOf" srcId="{4C1B39BF-F010-4321-A742-3FBC32925276}" destId="{47177BF1-5F2D-48EF-8497-21FE3FD9FE79}" srcOrd="0" destOrd="0" presId="urn:microsoft.com/office/officeart/2008/layout/RadialCluster"/>
-    <dgm:cxn modelId="{6A2E968B-2B00-4302-9A51-BA269571DA50}" type="presOf" srcId="{8E16C110-46DD-418E-B68B-41176C7363CB}" destId="{0B933785-8F10-4908-A031-95865622E3A9}" srcOrd="0" destOrd="0" presId="urn:microsoft.com/office/officeart/2008/layout/RadialCluster"/>
-    <dgm:cxn modelId="{0BB6BE93-6D07-4673-BD6D-65D3ADF9CEC3}" type="presOf" srcId="{2F4CBA2C-CAAA-42CF-B78F-87DEEF1B277A}" destId="{F3FFE5E4-1BC0-4B54-81AE-AA579CAF2653}" srcOrd="0" destOrd="0" presId="urn:microsoft.com/office/officeart/2008/layout/RadialCluster"/>
-    <dgm:cxn modelId="{A3229B7A-98F5-4A02-B1BC-20C1B2FD93E3}" srcId="{20BE8E71-F497-468A-8BCF-867CD172525E}" destId="{CDB2F97C-D222-4B7B-AD17-9B1FCACAE65F}" srcOrd="5" destOrd="0" parTransId="{6D930E7D-F4CB-4AC6-8B6C-E671E00D2CDA}" sibTransId="{3DB89215-6E3B-42AE-A1CB-3027719161AB}"/>
-    <dgm:cxn modelId="{CBD0D219-0D1F-4AD5-9833-EB8FF4BB68DE}" type="presOf" srcId="{A582B7BA-4838-4A95-B337-9DB7268116E5}" destId="{6A9A5629-B80C-4D13-8A9A-8E0030CA29C6}" srcOrd="0" destOrd="0" presId="urn:microsoft.com/office/officeart/2008/layout/RadialCluster"/>
-    <dgm:cxn modelId="{93F051FE-4DAD-4282-B99F-B0F7FF420B95}" srcId="{20BE8E71-F497-468A-8BCF-867CD172525E}" destId="{73692DD7-5A4E-48BB-B470-C5A4DA4EC749}" srcOrd="4" destOrd="0" parTransId="{8E16C110-46DD-418E-B68B-41176C7363CB}" sibTransId="{F993AD63-E991-4E38-8297-04B334507A7E}"/>
-    <dgm:cxn modelId="{F93764F6-6CF4-486A-B088-61AFCBE74DDC}" type="presOf" srcId="{4231E3A6-8236-41B8-8CD9-63D77671A4C8}" destId="{FB5C7847-0F50-42C0-A98F-6F92FFC53D0B}" srcOrd="0" destOrd="0" presId="urn:microsoft.com/office/officeart/2008/layout/RadialCluster"/>
-    <dgm:cxn modelId="{8C68F102-B0A2-4886-87E1-F9FB7D1B138B}" srcId="{20BE8E71-F497-468A-8BCF-867CD172525E}" destId="{BD98ED33-66DC-415F-9A6F-2546BAAF3B3D}" srcOrd="1" destOrd="0" parTransId="{14D5249F-26A5-4564-AB2D-600D54F71173}" sibTransId="{33D01D21-955E-4F24-A18E-4041C0D6DE2B}"/>
-    <dgm:cxn modelId="{9801DC9E-87CA-482B-BEFD-C61AA9E8153B}" type="presOf" srcId="{8F9A3036-4F59-4DA9-BC69-9C65CC5FF756}" destId="{4F1D4343-F068-4E09-A4D6-84538D008E3A}" srcOrd="0" destOrd="0" presId="urn:microsoft.com/office/officeart/2008/layout/RadialCluster"/>
-    <dgm:cxn modelId="{592CB8F0-757C-454F-820C-9ECAD0BA8C6C}" type="presOf" srcId="{23159B30-BD23-4DDD-8C73-F4E0AA557D76}" destId="{52F0F047-BCCC-42EF-9CAE-76E3CB0C88BA}" srcOrd="0" destOrd="0" presId="urn:microsoft.com/office/officeart/2008/layout/RadialCluster"/>
-    <dgm:cxn modelId="{C2859883-5757-46E9-8E4F-5E8DE07FE54E}" srcId="{20BE8E71-F497-468A-8BCF-867CD172525E}" destId="{4C1B39BF-F010-4321-A742-3FBC32925276}" srcOrd="6" destOrd="0" parTransId="{4231E3A6-8236-41B8-8CD9-63D77671A4C8}" sibTransId="{5200D3A7-3CAD-44FB-B8C1-9407EA7D36E6}"/>
-    <dgm:cxn modelId="{122508DC-A576-4A03-83E4-985FEF1A8B82}" srcId="{20BE8E71-F497-468A-8BCF-867CD172525E}" destId="{A582B7BA-4838-4A95-B337-9DB7268116E5}" srcOrd="3" destOrd="0" parTransId="{36786B02-748A-4748-B2D4-5874F7413149}" sibTransId="{4C297DF1-AEBE-4A83-A484-A60056753F8A}"/>
-    <dgm:cxn modelId="{C5384FD1-877F-4593-8247-FA395F924F75}" type="presOf" srcId="{14D5249F-26A5-4564-AB2D-600D54F71173}" destId="{B84AF4A8-3947-45EA-8993-17FEB967E4E7}" srcOrd="0" destOrd="0" presId="urn:microsoft.com/office/officeart/2008/layout/RadialCluster"/>
-    <dgm:cxn modelId="{37D790B7-A6B2-486C-AC56-3F127FDFC93D}" type="presOf" srcId="{2CAD2807-D227-4017-ADAE-4A618EC18CA1}" destId="{3C9F8E07-2750-4F18-8439-C39435BC2A48}" srcOrd="0" destOrd="0" presId="urn:microsoft.com/office/officeart/2008/layout/RadialCluster"/>
-    <dgm:cxn modelId="{84A1FB9D-2A24-4CE0-84DB-F1DA371028CC}" srcId="{2F4CBA2C-CAAA-42CF-B78F-87DEEF1B277A}" destId="{20BE8E71-F497-468A-8BCF-867CD172525E}" srcOrd="0" destOrd="0" parTransId="{10E7CD52-C70D-4B0D-BA73-39E7D6E0C441}" sibTransId="{C709E9FE-A76B-44F6-BBD4-8043D15198BD}"/>
     <dgm:cxn modelId="{CB4208AA-8711-4B6B-B368-C5B8083D375F}" type="presOf" srcId="{6D930E7D-F4CB-4AC6-8B6C-E671E00D2CDA}" destId="{B5E74FB8-825C-4828-9A1C-A241752DC65C}" srcOrd="0" destOrd="0" presId="urn:microsoft.com/office/officeart/2008/layout/RadialCluster"/>
-    <dgm:cxn modelId="{0E26857C-86C4-4BCD-9F66-26E63A1CA80C}" type="presOf" srcId="{BD98ED33-66DC-415F-9A6F-2546BAAF3B3D}" destId="{323636B3-28E9-4D84-9B24-4CA99FA81ACE}" srcOrd="0" destOrd="0" presId="urn:microsoft.com/office/officeart/2008/layout/RadialCluster"/>
     <dgm:cxn modelId="{61CD37EC-E091-4684-BA08-16DEF43099BB}" type="presOf" srcId="{7EA5189C-8A82-4E31-B8DE-1A2F0B8D4C54}" destId="{C2CB6F57-0576-413F-A293-A0E78B21B9F8}" srcOrd="0" destOrd="0" presId="urn:microsoft.com/office/officeart/2008/layout/RadialCluster"/>
-    <dgm:cxn modelId="{985F22C7-0E7D-42A9-953C-A246EBC99718}" srcId="{20BE8E71-F497-468A-8BCF-867CD172525E}" destId="{23159B30-BD23-4DDD-8C73-F4E0AA557D76}" srcOrd="0" destOrd="0" parTransId="{7EA5189C-8A82-4E31-B8DE-1A2F0B8D4C54}" sibTransId="{F4542481-DB3E-488C-ACCA-3E4EB5875099}"/>
     <dgm:cxn modelId="{137A4AF1-06F5-4D8A-8F96-21F19B99C142}" type="presOf" srcId="{73692DD7-5A4E-48BB-B470-C5A4DA4EC749}" destId="{42C18C40-B4AA-446C-B562-40C2969136A5}" srcOrd="0" destOrd="0" presId="urn:microsoft.com/office/officeart/2008/layout/RadialCluster"/>
-    <dgm:cxn modelId="{687A8EDA-2547-4B66-A2DF-5F77F1D17C87}" type="presOf" srcId="{20BE8E71-F497-468A-8BCF-867CD172525E}" destId="{EA7B28CB-2911-4779-869A-AEC78C5F1671}" srcOrd="0" destOrd="0" presId="urn:microsoft.com/office/officeart/2008/layout/RadialCluster"/>
-    <dgm:cxn modelId="{9AA18266-4943-45ED-A460-D5F91AC5B52E}" type="presOf" srcId="{36786B02-748A-4748-B2D4-5874F7413149}" destId="{F3A44B51-B4D8-4EB5-89F7-4849638C9113}" srcOrd="0" destOrd="0" presId="urn:microsoft.com/office/officeart/2008/layout/RadialCluster"/>
     <dgm:cxn modelId="{BFFCAA7A-7A50-4032-9C89-D6620E9AD265}" type="presParOf" srcId="{F3FFE5E4-1BC0-4B54-81AE-AA579CAF2653}" destId="{B22068D3-DDED-4F7A-869F-113F94CC087D}" srcOrd="0" destOrd="0" presId="urn:microsoft.com/office/officeart/2008/layout/RadialCluster"/>
     <dgm:cxn modelId="{22E76D57-FA4B-4090-8D7B-637F59289991}" type="presParOf" srcId="{B22068D3-DDED-4F7A-869F-113F94CC087D}" destId="{EA7B28CB-2911-4779-869A-AEC78C5F1671}" srcOrd="0" destOrd="0" presId="urn:microsoft.com/office/officeart/2008/layout/RadialCluster"/>
     <dgm:cxn modelId="{C4FCDBE5-0DDD-44F7-B65C-D908399031A9}" type="presParOf" srcId="{B22068D3-DDED-4F7A-869F-113F94CC087D}" destId="{C2CB6F57-0576-413F-A293-A0E78B21B9F8}" srcOrd="1" destOrd="0" presId="urn:microsoft.com/office/officeart/2008/layout/RadialCluster"/>
@@ -18681,39 +18681,6 @@
           </a:fontRef>
         </p:style>
       </p:cxnSp>
-      <p:cxnSp>
-        <p:nvCxnSpPr>
-          <p:cNvPr id="24" name="Straight Arrow Connector 23"/>
-          <p:cNvCxnSpPr/>
-          <p:nvPr/>
-        </p:nvCxnSpPr>
-        <p:spPr>
-          <a:xfrm flipV="1">
-            <a:off x="4705581" y="2892492"/>
-            <a:ext cx="890144" cy="620716"/>
-          </a:xfrm>
-          <a:prstGeom prst="straightConnector1">
-            <a:avLst/>
-          </a:prstGeom>
-          <a:ln>
-            <a:tailEnd type="arrow"/>
-          </a:ln>
-        </p:spPr>
-        <p:style>
-          <a:lnRef idx="2">
-            <a:schemeClr val="accent6"/>
-          </a:lnRef>
-          <a:fillRef idx="0">
-            <a:schemeClr val="accent6"/>
-          </a:fillRef>
-          <a:effectRef idx="1">
-            <a:schemeClr val="accent6"/>
-          </a:effectRef>
-          <a:fontRef idx="minor">
-            <a:schemeClr val="tx1"/>
-          </a:fontRef>
-        </p:style>
-      </p:cxnSp>
     </p:spTree>
     <p:extLst>
       <p:ext uri="{BB962C8B-B14F-4D97-AF65-F5344CB8AC3E}">

</xml_diff>

<commit_message>
Added my notes for ppt
</commit_message>
<xml_diff>
--- a/Documentation/Design Reviews/Design Review 1.pptx
+++ b/Documentation/Design Reviews/Design Review 1.pptx
@@ -1669,30 +1669,30 @@
     </dgm:pt>
   </dgm:ptLst>
   <dgm:cxnLst>
+    <dgm:cxn modelId="{86581E74-C593-4A2D-BD5E-CE1BC5CC7E25}" srcId="{20BE8E71-F497-468A-8BCF-867CD172525E}" destId="{8F9A3036-4F59-4DA9-BC69-9C65CC5FF756}" srcOrd="2" destOrd="0" parTransId="{2CAD2807-D227-4017-ADAE-4A618EC18CA1}" sibTransId="{37768D46-5764-48A9-B061-92B3238D2032}"/>
+    <dgm:cxn modelId="{26F7855D-5015-4F58-ADC8-48ABC6F68CC6}" type="presOf" srcId="{CDB2F97C-D222-4B7B-AD17-9B1FCACAE65F}" destId="{946220FF-E030-4205-92BF-46A67B7F2879}" srcOrd="0" destOrd="0" presId="urn:microsoft.com/office/officeart/2008/layout/RadialCluster"/>
     <dgm:cxn modelId="{3315D23B-2CFF-4564-8C5B-949FBD8DF287}" type="presOf" srcId="{4C1B39BF-F010-4321-A742-3FBC32925276}" destId="{47177BF1-5F2D-48EF-8497-21FE3FD9FE79}" srcOrd="0" destOrd="0" presId="urn:microsoft.com/office/officeart/2008/layout/RadialCluster"/>
+    <dgm:cxn modelId="{6A2E968B-2B00-4302-9A51-BA269571DA50}" type="presOf" srcId="{8E16C110-46DD-418E-B68B-41176C7363CB}" destId="{0B933785-8F10-4908-A031-95865622E3A9}" srcOrd="0" destOrd="0" presId="urn:microsoft.com/office/officeart/2008/layout/RadialCluster"/>
+    <dgm:cxn modelId="{0BB6BE93-6D07-4673-BD6D-65D3ADF9CEC3}" type="presOf" srcId="{2F4CBA2C-CAAA-42CF-B78F-87DEEF1B277A}" destId="{F3FFE5E4-1BC0-4B54-81AE-AA579CAF2653}" srcOrd="0" destOrd="0" presId="urn:microsoft.com/office/officeart/2008/layout/RadialCluster"/>
+    <dgm:cxn modelId="{A3229B7A-98F5-4A02-B1BC-20C1B2FD93E3}" srcId="{20BE8E71-F497-468A-8BCF-867CD172525E}" destId="{CDB2F97C-D222-4B7B-AD17-9B1FCACAE65F}" srcOrd="5" destOrd="0" parTransId="{6D930E7D-F4CB-4AC6-8B6C-E671E00D2CDA}" sibTransId="{3DB89215-6E3B-42AE-A1CB-3027719161AB}"/>
+    <dgm:cxn modelId="{CBD0D219-0D1F-4AD5-9833-EB8FF4BB68DE}" type="presOf" srcId="{A582B7BA-4838-4A95-B337-9DB7268116E5}" destId="{6A9A5629-B80C-4D13-8A9A-8E0030CA29C6}" srcOrd="0" destOrd="0" presId="urn:microsoft.com/office/officeart/2008/layout/RadialCluster"/>
     <dgm:cxn modelId="{93F051FE-4DAD-4282-B99F-B0F7FF420B95}" srcId="{20BE8E71-F497-468A-8BCF-867CD172525E}" destId="{73692DD7-5A4E-48BB-B470-C5A4DA4EC749}" srcOrd="4" destOrd="0" parTransId="{8E16C110-46DD-418E-B68B-41176C7363CB}" sibTransId="{F993AD63-E991-4E38-8297-04B334507A7E}"/>
+    <dgm:cxn modelId="{F93764F6-6CF4-486A-B088-61AFCBE74DDC}" type="presOf" srcId="{4231E3A6-8236-41B8-8CD9-63D77671A4C8}" destId="{FB5C7847-0F50-42C0-A98F-6F92FFC53D0B}" srcOrd="0" destOrd="0" presId="urn:microsoft.com/office/officeart/2008/layout/RadialCluster"/>
+    <dgm:cxn modelId="{8C68F102-B0A2-4886-87E1-F9FB7D1B138B}" srcId="{20BE8E71-F497-468A-8BCF-867CD172525E}" destId="{BD98ED33-66DC-415F-9A6F-2546BAAF3B3D}" srcOrd="1" destOrd="0" parTransId="{14D5249F-26A5-4564-AB2D-600D54F71173}" sibTransId="{33D01D21-955E-4F24-A18E-4041C0D6DE2B}"/>
     <dgm:cxn modelId="{9801DC9E-87CA-482B-BEFD-C61AA9E8153B}" type="presOf" srcId="{8F9A3036-4F59-4DA9-BC69-9C65CC5FF756}" destId="{4F1D4343-F068-4E09-A4D6-84538D008E3A}" srcOrd="0" destOrd="0" presId="urn:microsoft.com/office/officeart/2008/layout/RadialCluster"/>
+    <dgm:cxn modelId="{592CB8F0-757C-454F-820C-9ECAD0BA8C6C}" type="presOf" srcId="{23159B30-BD23-4DDD-8C73-F4E0AA557D76}" destId="{52F0F047-BCCC-42EF-9CAE-76E3CB0C88BA}" srcOrd="0" destOrd="0" presId="urn:microsoft.com/office/officeart/2008/layout/RadialCluster"/>
     <dgm:cxn modelId="{C2859883-5757-46E9-8E4F-5E8DE07FE54E}" srcId="{20BE8E71-F497-468A-8BCF-867CD172525E}" destId="{4C1B39BF-F010-4321-A742-3FBC32925276}" srcOrd="6" destOrd="0" parTransId="{4231E3A6-8236-41B8-8CD9-63D77671A4C8}" sibTransId="{5200D3A7-3CAD-44FB-B8C1-9407EA7D36E6}"/>
+    <dgm:cxn modelId="{122508DC-A576-4A03-83E4-985FEF1A8B82}" srcId="{20BE8E71-F497-468A-8BCF-867CD172525E}" destId="{A582B7BA-4838-4A95-B337-9DB7268116E5}" srcOrd="3" destOrd="0" parTransId="{36786B02-748A-4748-B2D4-5874F7413149}" sibTransId="{4C297DF1-AEBE-4A83-A484-A60056753F8A}"/>
+    <dgm:cxn modelId="{C5384FD1-877F-4593-8247-FA395F924F75}" type="presOf" srcId="{14D5249F-26A5-4564-AB2D-600D54F71173}" destId="{B84AF4A8-3947-45EA-8993-17FEB967E4E7}" srcOrd="0" destOrd="0" presId="urn:microsoft.com/office/officeart/2008/layout/RadialCluster"/>
     <dgm:cxn modelId="{37D790B7-A6B2-486C-AC56-3F127FDFC93D}" type="presOf" srcId="{2CAD2807-D227-4017-ADAE-4A618EC18CA1}" destId="{3C9F8E07-2750-4F18-8439-C39435BC2A48}" srcOrd="0" destOrd="0" presId="urn:microsoft.com/office/officeart/2008/layout/RadialCluster"/>
-    <dgm:cxn modelId="{CBD0D219-0D1F-4AD5-9833-EB8FF4BB68DE}" type="presOf" srcId="{A582B7BA-4838-4A95-B337-9DB7268116E5}" destId="{6A9A5629-B80C-4D13-8A9A-8E0030CA29C6}" srcOrd="0" destOrd="0" presId="urn:microsoft.com/office/officeart/2008/layout/RadialCluster"/>
     <dgm:cxn modelId="{84A1FB9D-2A24-4CE0-84DB-F1DA371028CC}" srcId="{2F4CBA2C-CAAA-42CF-B78F-87DEEF1B277A}" destId="{20BE8E71-F497-468A-8BCF-867CD172525E}" srcOrd="0" destOrd="0" parTransId="{10E7CD52-C70D-4B0D-BA73-39E7D6E0C441}" sibTransId="{C709E9FE-A76B-44F6-BBD4-8043D15198BD}"/>
-    <dgm:cxn modelId="{A3229B7A-98F5-4A02-B1BC-20C1B2FD93E3}" srcId="{20BE8E71-F497-468A-8BCF-867CD172525E}" destId="{CDB2F97C-D222-4B7B-AD17-9B1FCACAE65F}" srcOrd="5" destOrd="0" parTransId="{6D930E7D-F4CB-4AC6-8B6C-E671E00D2CDA}" sibTransId="{3DB89215-6E3B-42AE-A1CB-3027719161AB}"/>
+    <dgm:cxn modelId="{CB4208AA-8711-4B6B-B368-C5B8083D375F}" type="presOf" srcId="{6D930E7D-F4CB-4AC6-8B6C-E671E00D2CDA}" destId="{B5E74FB8-825C-4828-9A1C-A241752DC65C}" srcOrd="0" destOrd="0" presId="urn:microsoft.com/office/officeart/2008/layout/RadialCluster"/>
+    <dgm:cxn modelId="{0E26857C-86C4-4BCD-9F66-26E63A1CA80C}" type="presOf" srcId="{BD98ED33-66DC-415F-9A6F-2546BAAF3B3D}" destId="{323636B3-28E9-4D84-9B24-4CA99FA81ACE}" srcOrd="0" destOrd="0" presId="urn:microsoft.com/office/officeart/2008/layout/RadialCluster"/>
+    <dgm:cxn modelId="{61CD37EC-E091-4684-BA08-16DEF43099BB}" type="presOf" srcId="{7EA5189C-8A82-4E31-B8DE-1A2F0B8D4C54}" destId="{C2CB6F57-0576-413F-A293-A0E78B21B9F8}" srcOrd="0" destOrd="0" presId="urn:microsoft.com/office/officeart/2008/layout/RadialCluster"/>
+    <dgm:cxn modelId="{985F22C7-0E7D-42A9-953C-A246EBC99718}" srcId="{20BE8E71-F497-468A-8BCF-867CD172525E}" destId="{23159B30-BD23-4DDD-8C73-F4E0AA557D76}" srcOrd="0" destOrd="0" parTransId="{7EA5189C-8A82-4E31-B8DE-1A2F0B8D4C54}" sibTransId="{F4542481-DB3E-488C-ACCA-3E4EB5875099}"/>
+    <dgm:cxn modelId="{137A4AF1-06F5-4D8A-8F96-21F19B99C142}" type="presOf" srcId="{73692DD7-5A4E-48BB-B470-C5A4DA4EC749}" destId="{42C18C40-B4AA-446C-B562-40C2969136A5}" srcOrd="0" destOrd="0" presId="urn:microsoft.com/office/officeart/2008/layout/RadialCluster"/>
     <dgm:cxn modelId="{687A8EDA-2547-4B66-A2DF-5F77F1D17C87}" type="presOf" srcId="{20BE8E71-F497-468A-8BCF-867CD172525E}" destId="{EA7B28CB-2911-4779-869A-AEC78C5F1671}" srcOrd="0" destOrd="0" presId="urn:microsoft.com/office/officeart/2008/layout/RadialCluster"/>
-    <dgm:cxn modelId="{0BB6BE93-6D07-4673-BD6D-65D3ADF9CEC3}" type="presOf" srcId="{2F4CBA2C-CAAA-42CF-B78F-87DEEF1B277A}" destId="{F3FFE5E4-1BC0-4B54-81AE-AA579CAF2653}" srcOrd="0" destOrd="0" presId="urn:microsoft.com/office/officeart/2008/layout/RadialCluster"/>
-    <dgm:cxn modelId="{8C68F102-B0A2-4886-87E1-F9FB7D1B138B}" srcId="{20BE8E71-F497-468A-8BCF-867CD172525E}" destId="{BD98ED33-66DC-415F-9A6F-2546BAAF3B3D}" srcOrd="1" destOrd="0" parTransId="{14D5249F-26A5-4564-AB2D-600D54F71173}" sibTransId="{33D01D21-955E-4F24-A18E-4041C0D6DE2B}"/>
-    <dgm:cxn modelId="{86581E74-C593-4A2D-BD5E-CE1BC5CC7E25}" srcId="{20BE8E71-F497-468A-8BCF-867CD172525E}" destId="{8F9A3036-4F59-4DA9-BC69-9C65CC5FF756}" srcOrd="2" destOrd="0" parTransId="{2CAD2807-D227-4017-ADAE-4A618EC18CA1}" sibTransId="{37768D46-5764-48A9-B061-92B3238D2032}"/>
-    <dgm:cxn modelId="{592CB8F0-757C-454F-820C-9ECAD0BA8C6C}" type="presOf" srcId="{23159B30-BD23-4DDD-8C73-F4E0AA557D76}" destId="{52F0F047-BCCC-42EF-9CAE-76E3CB0C88BA}" srcOrd="0" destOrd="0" presId="urn:microsoft.com/office/officeart/2008/layout/RadialCluster"/>
-    <dgm:cxn modelId="{985F22C7-0E7D-42A9-953C-A246EBC99718}" srcId="{20BE8E71-F497-468A-8BCF-867CD172525E}" destId="{23159B30-BD23-4DDD-8C73-F4E0AA557D76}" srcOrd="0" destOrd="0" parTransId="{7EA5189C-8A82-4E31-B8DE-1A2F0B8D4C54}" sibTransId="{F4542481-DB3E-488C-ACCA-3E4EB5875099}"/>
-    <dgm:cxn modelId="{0E26857C-86C4-4BCD-9F66-26E63A1CA80C}" type="presOf" srcId="{BD98ED33-66DC-415F-9A6F-2546BAAF3B3D}" destId="{323636B3-28E9-4D84-9B24-4CA99FA81ACE}" srcOrd="0" destOrd="0" presId="urn:microsoft.com/office/officeart/2008/layout/RadialCluster"/>
     <dgm:cxn modelId="{9AA18266-4943-45ED-A460-D5F91AC5B52E}" type="presOf" srcId="{36786B02-748A-4748-B2D4-5874F7413149}" destId="{F3A44B51-B4D8-4EB5-89F7-4849638C9113}" srcOrd="0" destOrd="0" presId="urn:microsoft.com/office/officeart/2008/layout/RadialCluster"/>
-    <dgm:cxn modelId="{C5384FD1-877F-4593-8247-FA395F924F75}" type="presOf" srcId="{14D5249F-26A5-4564-AB2D-600D54F71173}" destId="{B84AF4A8-3947-45EA-8993-17FEB967E4E7}" srcOrd="0" destOrd="0" presId="urn:microsoft.com/office/officeart/2008/layout/RadialCluster"/>
-    <dgm:cxn modelId="{6A2E968B-2B00-4302-9A51-BA269571DA50}" type="presOf" srcId="{8E16C110-46DD-418E-B68B-41176C7363CB}" destId="{0B933785-8F10-4908-A031-95865622E3A9}" srcOrd="0" destOrd="0" presId="urn:microsoft.com/office/officeart/2008/layout/RadialCluster"/>
-    <dgm:cxn modelId="{122508DC-A576-4A03-83E4-985FEF1A8B82}" srcId="{20BE8E71-F497-468A-8BCF-867CD172525E}" destId="{A582B7BA-4838-4A95-B337-9DB7268116E5}" srcOrd="3" destOrd="0" parTransId="{36786B02-748A-4748-B2D4-5874F7413149}" sibTransId="{4C297DF1-AEBE-4A83-A484-A60056753F8A}"/>
-    <dgm:cxn modelId="{F93764F6-6CF4-486A-B088-61AFCBE74DDC}" type="presOf" srcId="{4231E3A6-8236-41B8-8CD9-63D77671A4C8}" destId="{FB5C7847-0F50-42C0-A98F-6F92FFC53D0B}" srcOrd="0" destOrd="0" presId="urn:microsoft.com/office/officeart/2008/layout/RadialCluster"/>
-    <dgm:cxn modelId="{26F7855D-5015-4F58-ADC8-48ABC6F68CC6}" type="presOf" srcId="{CDB2F97C-D222-4B7B-AD17-9B1FCACAE65F}" destId="{946220FF-E030-4205-92BF-46A67B7F2879}" srcOrd="0" destOrd="0" presId="urn:microsoft.com/office/officeart/2008/layout/RadialCluster"/>
-    <dgm:cxn modelId="{CB4208AA-8711-4B6B-B368-C5B8083D375F}" type="presOf" srcId="{6D930E7D-F4CB-4AC6-8B6C-E671E00D2CDA}" destId="{B5E74FB8-825C-4828-9A1C-A241752DC65C}" srcOrd="0" destOrd="0" presId="urn:microsoft.com/office/officeart/2008/layout/RadialCluster"/>
-    <dgm:cxn modelId="{61CD37EC-E091-4684-BA08-16DEF43099BB}" type="presOf" srcId="{7EA5189C-8A82-4E31-B8DE-1A2F0B8D4C54}" destId="{C2CB6F57-0576-413F-A293-A0E78B21B9F8}" srcOrd="0" destOrd="0" presId="urn:microsoft.com/office/officeart/2008/layout/RadialCluster"/>
-    <dgm:cxn modelId="{137A4AF1-06F5-4D8A-8F96-21F19B99C142}" type="presOf" srcId="{73692DD7-5A4E-48BB-B470-C5A4DA4EC749}" destId="{42C18C40-B4AA-446C-B562-40C2969136A5}" srcOrd="0" destOrd="0" presId="urn:microsoft.com/office/officeart/2008/layout/RadialCluster"/>
     <dgm:cxn modelId="{BFFCAA7A-7A50-4032-9C89-D6620E9AD265}" type="presParOf" srcId="{F3FFE5E4-1BC0-4B54-81AE-AA579CAF2653}" destId="{B22068D3-DDED-4F7A-869F-113F94CC087D}" srcOrd="0" destOrd="0" presId="urn:microsoft.com/office/officeart/2008/layout/RadialCluster"/>
     <dgm:cxn modelId="{22E76D57-FA4B-4090-8D7B-637F59289991}" type="presParOf" srcId="{B22068D3-DDED-4F7A-869F-113F94CC087D}" destId="{EA7B28CB-2911-4779-869A-AEC78C5F1671}" srcOrd="0" destOrd="0" presId="urn:microsoft.com/office/officeart/2008/layout/RadialCluster"/>
     <dgm:cxn modelId="{C4FCDBE5-0DDD-44F7-B65C-D908399031A9}" type="presParOf" srcId="{B22068D3-DDED-4F7A-869F-113F94CC087D}" destId="{C2CB6F57-0576-413F-A293-A0E78B21B9F8}" srcOrd="1" destOrd="0" presId="urn:microsoft.com/office/officeart/2008/layout/RadialCluster"/>
@@ -8007,7 +8007,76 @@
               <a:rPr lang="en-US" dirty="0" smtClean="0"/>
               <a:t>Ruffin</a:t>
             </a:r>
-            <a:endParaRPr lang="en-US" dirty="0"/>
+          </a:p>
+          <a:p>
+            <a:r>
+              <a:rPr lang="en-US" sz="1200" kern="1200" dirty="0" smtClean="0">
+                <a:solidFill>
+                  <a:schemeClr val="tx1"/>
+                </a:solidFill>
+                <a:effectLst/>
+                <a:latin typeface="+mn-lt"/>
+                <a:ea typeface="+mn-ea"/>
+                <a:cs typeface="+mn-cs"/>
+              </a:rPr>
+              <a:t>Includes 3 moving joints, all motorized</a:t>
+            </a:r>
+          </a:p>
+          <a:p>
+            <a:r>
+              <a:rPr lang="en-US" sz="1200" kern="1200" dirty="0" smtClean="0">
+                <a:solidFill>
+                  <a:schemeClr val="tx1"/>
+                </a:solidFill>
+                <a:effectLst/>
+                <a:latin typeface="+mn-lt"/>
+                <a:ea typeface="+mn-ea"/>
+                <a:cs typeface="+mn-cs"/>
+              </a:rPr>
+              <a:t> </a:t>
+            </a:r>
+          </a:p>
+          <a:p>
+            <a:r>
+              <a:rPr lang="en-US" sz="1200" kern="1200" dirty="0" smtClean="0">
+                <a:solidFill>
+                  <a:schemeClr val="tx1"/>
+                </a:solidFill>
+                <a:effectLst/>
+                <a:latin typeface="+mn-lt"/>
+                <a:ea typeface="+mn-ea"/>
+                <a:cs typeface="+mn-cs"/>
+              </a:rPr>
+              <a:t>Balanced Placement of components</a:t>
+            </a:r>
+          </a:p>
+          <a:p>
+            <a:r>
+              <a:rPr lang="en-US" sz="1200" kern="1200" dirty="0" smtClean="0">
+                <a:solidFill>
+                  <a:schemeClr val="tx1"/>
+                </a:solidFill>
+                <a:effectLst/>
+                <a:latin typeface="+mn-lt"/>
+                <a:ea typeface="+mn-ea"/>
+                <a:cs typeface="+mn-cs"/>
+              </a:rPr>
+              <a:t>High degree of symmetry</a:t>
+            </a:r>
+          </a:p>
+          <a:p>
+            <a:r>
+              <a:rPr lang="en-US" sz="1200" kern="1200" dirty="0" smtClean="0">
+                <a:solidFill>
+                  <a:schemeClr val="tx1"/>
+                </a:solidFill>
+                <a:effectLst/>
+                <a:latin typeface="+mn-lt"/>
+                <a:ea typeface="+mn-ea"/>
+                <a:cs typeface="+mn-cs"/>
+              </a:rPr>
+              <a:t>Center of gravity in the middle</a:t>
+            </a:r>
           </a:p>
         </p:txBody>
       </p:sp>
@@ -8095,7 +8164,236 @@
               <a:rPr lang="en-US" dirty="0" smtClean="0"/>
               <a:t>Ruffin</a:t>
             </a:r>
-            <a:endParaRPr lang="en-US" dirty="0"/>
+          </a:p>
+          <a:p>
+            <a:r>
+              <a:rPr lang="en-US" sz="1200" kern="1200" dirty="0" smtClean="0">
+                <a:solidFill>
+                  <a:schemeClr val="tx1"/>
+                </a:solidFill>
+                <a:effectLst/>
+                <a:latin typeface="+mn-lt"/>
+                <a:ea typeface="+mn-ea"/>
+                <a:cs typeface="+mn-cs"/>
+              </a:rPr>
+              <a:t>Robot is displaced by an external force</a:t>
+            </a:r>
+          </a:p>
+          <a:p>
+            <a:r>
+              <a:rPr lang="en-US" sz="1200" kern="1200" dirty="0" smtClean="0">
+                <a:solidFill>
+                  <a:schemeClr val="tx1"/>
+                </a:solidFill>
+                <a:effectLst/>
+                <a:latin typeface="+mn-lt"/>
+                <a:ea typeface="+mn-ea"/>
+                <a:cs typeface="+mn-cs"/>
+              </a:rPr>
+              <a:t>Robot tilts off in the Y direction</a:t>
+            </a:r>
+          </a:p>
+          <a:p>
+            <a:r>
+              <a:rPr lang="en-US" sz="1200" kern="1200" dirty="0" smtClean="0">
+                <a:solidFill>
+                  <a:schemeClr val="tx1"/>
+                </a:solidFill>
+                <a:effectLst/>
+                <a:latin typeface="+mn-lt"/>
+                <a:ea typeface="+mn-ea"/>
+                <a:cs typeface="+mn-cs"/>
+              </a:rPr>
+              <a:t>IMU reads this displacement of side to side motion</a:t>
+            </a:r>
+          </a:p>
+          <a:p>
+            <a:r>
+              <a:rPr lang="en-US" sz="1200" kern="1200" dirty="0" smtClean="0">
+                <a:solidFill>
+                  <a:schemeClr val="tx1"/>
+                </a:solidFill>
+                <a:effectLst/>
+                <a:latin typeface="+mn-lt"/>
+                <a:ea typeface="+mn-ea"/>
+                <a:cs typeface="+mn-cs"/>
+              </a:rPr>
+              <a:t> </a:t>
+            </a:r>
+          </a:p>
+          <a:p>
+            <a:r>
+              <a:rPr lang="en-US" sz="1200" kern="1200" dirty="0" smtClean="0">
+                <a:solidFill>
+                  <a:schemeClr val="tx1"/>
+                </a:solidFill>
+                <a:effectLst/>
+                <a:latin typeface="+mn-lt"/>
+                <a:ea typeface="+mn-ea"/>
+                <a:cs typeface="+mn-cs"/>
+              </a:rPr>
+              <a:t>1</a:t>
+            </a:r>
+            <a:r>
+              <a:rPr lang="en-US" sz="1200" kern="1200" baseline="30000" dirty="0" smtClean="0">
+                <a:solidFill>
+                  <a:schemeClr val="tx1"/>
+                </a:solidFill>
+                <a:effectLst/>
+                <a:latin typeface="+mn-lt"/>
+                <a:ea typeface="+mn-ea"/>
+                <a:cs typeface="+mn-cs"/>
+              </a:rPr>
+              <a:t>st</a:t>
+            </a:r>
+            <a:r>
+              <a:rPr lang="en-US" sz="1200" kern="1200" dirty="0" smtClean="0">
+                <a:solidFill>
+                  <a:schemeClr val="tx1"/>
+                </a:solidFill>
+                <a:effectLst/>
+                <a:latin typeface="+mn-lt"/>
+                <a:ea typeface="+mn-ea"/>
+                <a:cs typeface="+mn-cs"/>
+              </a:rPr>
+              <a:t> system control</a:t>
+            </a:r>
+          </a:p>
+          <a:p>
+            <a:r>
+              <a:rPr lang="en-US" sz="1200" kern="1200" dirty="0" smtClean="0">
+                <a:solidFill>
+                  <a:schemeClr val="tx1"/>
+                </a:solidFill>
+                <a:effectLst/>
+                <a:latin typeface="+mn-lt"/>
+                <a:ea typeface="+mn-ea"/>
+                <a:cs typeface="+mn-cs"/>
+              </a:rPr>
+              <a:t>Torsion motor turns the gyro clockwise</a:t>
+            </a:r>
+          </a:p>
+          <a:p>
+            <a:r>
+              <a:rPr lang="en-US" sz="1200" kern="1200" dirty="0" smtClean="0">
+                <a:solidFill>
+                  <a:schemeClr val="tx1"/>
+                </a:solidFill>
+                <a:effectLst/>
+                <a:latin typeface="+mn-lt"/>
+                <a:ea typeface="+mn-ea"/>
+                <a:cs typeface="+mn-cs"/>
+              </a:rPr>
+              <a:t>This torques the bottom frame counter clockwise</a:t>
+            </a:r>
+          </a:p>
+          <a:p>
+            <a:r>
+              <a:rPr lang="en-US" sz="1200" kern="1200" dirty="0" smtClean="0">
+                <a:solidFill>
+                  <a:schemeClr val="tx1"/>
+                </a:solidFill>
+                <a:effectLst/>
+                <a:latin typeface="+mn-lt"/>
+                <a:ea typeface="+mn-ea"/>
+                <a:cs typeface="+mn-cs"/>
+              </a:rPr>
+              <a:t>This continues until the IMU is displaced only in the forward and backward frame</a:t>
+            </a:r>
+          </a:p>
+          <a:p>
+            <a:r>
+              <a:rPr lang="en-US" sz="1200" kern="1200" dirty="0" smtClean="0">
+                <a:solidFill>
+                  <a:schemeClr val="tx1"/>
+                </a:solidFill>
+                <a:effectLst/>
+                <a:latin typeface="+mn-lt"/>
+                <a:ea typeface="+mn-ea"/>
+                <a:cs typeface="+mn-cs"/>
+              </a:rPr>
+              <a:t> </a:t>
+            </a:r>
+          </a:p>
+          <a:p>
+            <a:r>
+              <a:rPr lang="en-US" sz="1200" kern="1200" dirty="0" smtClean="0">
+                <a:solidFill>
+                  <a:schemeClr val="tx1"/>
+                </a:solidFill>
+                <a:effectLst/>
+                <a:latin typeface="+mn-lt"/>
+                <a:ea typeface="+mn-ea"/>
+                <a:cs typeface="+mn-cs"/>
+              </a:rPr>
+              <a:t>2</a:t>
+            </a:r>
+            <a:r>
+              <a:rPr lang="en-US" sz="1200" kern="1200" baseline="30000" dirty="0" smtClean="0">
+                <a:solidFill>
+                  <a:schemeClr val="tx1"/>
+                </a:solidFill>
+                <a:effectLst/>
+                <a:latin typeface="+mn-lt"/>
+                <a:ea typeface="+mn-ea"/>
+                <a:cs typeface="+mn-cs"/>
+              </a:rPr>
+              <a:t>nd</a:t>
+            </a:r>
+            <a:r>
+              <a:rPr lang="en-US" sz="1200" kern="1200" dirty="0" smtClean="0">
+                <a:solidFill>
+                  <a:schemeClr val="tx1"/>
+                </a:solidFill>
+                <a:effectLst/>
+                <a:latin typeface="+mn-lt"/>
+                <a:ea typeface="+mn-ea"/>
+                <a:cs typeface="+mn-cs"/>
+              </a:rPr>
+              <a:t> system control</a:t>
+            </a:r>
+          </a:p>
+          <a:p>
+            <a:r>
+              <a:rPr lang="en-US" sz="1200" kern="1200" dirty="0" smtClean="0">
+                <a:solidFill>
+                  <a:schemeClr val="tx1"/>
+                </a:solidFill>
+                <a:effectLst/>
+                <a:latin typeface="+mn-lt"/>
+                <a:ea typeface="+mn-ea"/>
+                <a:cs typeface="+mn-cs"/>
+              </a:rPr>
+              <a:t>Then once the robot has resumed a single plane of displacement </a:t>
+            </a:r>
+          </a:p>
+          <a:p>
+            <a:r>
+              <a:rPr lang="en-US" sz="1200" kern="1200" dirty="0" smtClean="0">
+                <a:solidFill>
+                  <a:schemeClr val="tx1"/>
+                </a:solidFill>
+                <a:effectLst/>
+                <a:latin typeface="+mn-lt"/>
+                <a:ea typeface="+mn-ea"/>
+                <a:cs typeface="+mn-cs"/>
+              </a:rPr>
+              <a:t>parallel with the drive wheel</a:t>
+            </a:r>
+          </a:p>
+          <a:p>
+            <a:r>
+              <a:rPr lang="en-US" sz="1200" kern="1200" dirty="0" smtClean="0">
+                <a:solidFill>
+                  <a:schemeClr val="tx1"/>
+                </a:solidFill>
+                <a:effectLst/>
+                <a:latin typeface="+mn-lt"/>
+                <a:ea typeface="+mn-ea"/>
+                <a:cs typeface="+mn-cs"/>
+              </a:rPr>
+              <a:t>the system acts an inverted pendulum and proceeds to balance forward and backward</a:t>
+            </a:r>
           </a:p>
         </p:txBody>
       </p:sp>
@@ -8183,7 +8481,20 @@
               <a:rPr lang="en-US" dirty="0" smtClean="0"/>
               <a:t>Ruffin</a:t>
             </a:r>
-            <a:endParaRPr lang="en-US" dirty="0"/>
+          </a:p>
+          <a:p>
+            <a:r>
+              <a:rPr lang="en-US" sz="1200" kern="1200" dirty="0" smtClean="0">
+                <a:solidFill>
+                  <a:schemeClr val="tx1"/>
+                </a:solidFill>
+                <a:effectLst/>
+                <a:latin typeface="+mn-lt"/>
+                <a:ea typeface="+mn-ea"/>
+                <a:cs typeface="+mn-cs"/>
+              </a:rPr>
+              <a:t>Basic part placement</a:t>
+            </a:r>
           </a:p>
         </p:txBody>
       </p:sp>
@@ -8539,6 +8850,71 @@
               <a:rPr lang="en-US" dirty="0" smtClean="0"/>
               <a:t>Ruffin</a:t>
             </a:r>
+            <a:endParaRPr lang="en-US" sz="1200" kern="1200" dirty="0" smtClean="0">
+              <a:solidFill>
+                <a:schemeClr val="tx1"/>
+              </a:solidFill>
+              <a:effectLst/>
+              <a:latin typeface="+mn-lt"/>
+              <a:ea typeface="+mn-ea"/>
+              <a:cs typeface="+mn-cs"/>
+            </a:endParaRPr>
+          </a:p>
+          <a:p>
+            <a:r>
+              <a:rPr lang="en-US" sz="1200" kern="1200" dirty="0" err="1" smtClean="0">
+                <a:solidFill>
+                  <a:schemeClr val="tx1"/>
+                </a:solidFill>
+                <a:effectLst/>
+                <a:latin typeface="+mn-lt"/>
+                <a:ea typeface="+mn-ea"/>
+                <a:cs typeface="+mn-cs"/>
+              </a:rPr>
+              <a:t>Labview</a:t>
+            </a:r>
+            <a:r>
+              <a:rPr lang="en-US" sz="1200" kern="1200" dirty="0" smtClean="0">
+                <a:solidFill>
+                  <a:schemeClr val="tx1"/>
+                </a:solidFill>
+                <a:effectLst/>
+                <a:latin typeface="+mn-lt"/>
+                <a:ea typeface="+mn-ea"/>
+                <a:cs typeface="+mn-cs"/>
+              </a:rPr>
+              <a:t> Robotics Simulation Builder</a:t>
+            </a:r>
+          </a:p>
+          <a:p>
+            <a:r>
+              <a:rPr lang="en-US" sz="1200" kern="1200" dirty="0" smtClean="0">
+                <a:solidFill>
+                  <a:schemeClr val="tx1"/>
+                </a:solidFill>
+                <a:effectLst/>
+                <a:latin typeface="+mn-lt"/>
+                <a:ea typeface="+mn-ea"/>
+                <a:cs typeface="+mn-cs"/>
+              </a:rPr>
+              <a:t>With actuator and sensors</a:t>
+            </a:r>
+          </a:p>
+          <a:p>
+            <a:r>
+              <a:rPr lang="en-US" sz="1200" kern="1200" dirty="0" smtClean="0">
+                <a:solidFill>
+                  <a:schemeClr val="tx1"/>
+                </a:solidFill>
+                <a:effectLst/>
+                <a:latin typeface="+mn-lt"/>
+                <a:ea typeface="+mn-ea"/>
+                <a:cs typeface="+mn-cs"/>
+              </a:rPr>
+              <a:t>Build levels of complexity</a:t>
+            </a:r>
+          </a:p>
+          <a:p>
             <a:endParaRPr lang="en-US" dirty="0"/>
           </a:p>
         </p:txBody>

</xml_diff>